<commit_message>
Added diagrams to Dining Philosophers
</commit_message>
<xml_diff>
--- a/DiningPhilosophers/DiningPhilosophers.pptx
+++ b/DiningPhilosophers/DiningPhilosophers.pptx
@@ -5,7 +5,7 @@
     <p:sldMasterId id="2147483648" r:id="rId1"/>
   </p:sldMasterIdLst>
   <p:notesMasterIdLst>
-    <p:notesMasterId r:id="rId24"/>
+    <p:notesMasterId r:id="rId25"/>
   </p:notesMasterIdLst>
   <p:sldIdLst>
     <p:sldId id="289" r:id="rId2"/>
@@ -30,6 +30,7 @@
     <p:sldId id="294" r:id="rId21"/>
     <p:sldId id="295" r:id="rId22"/>
     <p:sldId id="298" r:id="rId23"/>
+    <p:sldId id="306" r:id="rId24"/>
   </p:sldIdLst>
   <p:sldSz cx="9144000" cy="6858000" type="screen4x3"/>
   <p:notesSz cx="6858000" cy="9144000"/>
@@ -213,7 +214,7 @@
           <a:p>
             <a:fld id="{7F106B22-C872-4141-ADA1-0D64B23463E7}" type="datetimeFigureOut">
               <a:rPr lang="en-US" smtClean="0"/>
-              <a:t>8/4/21</a:t>
+              <a:t>11/16/21</a:t>
             </a:fld>
             <a:endParaRPr lang="en-US"/>
           </a:p>
@@ -746,7 +747,7 @@
           <a:p>
             <a:fld id="{CAD6E01A-BBAC-4444-B0EB-2834B74A04A6}" type="datetimeFigureOut">
               <a:rPr lang="en-US" smtClean="0"/>
-              <a:t>8/1/21</a:t>
+              <a:t>11/16/21</a:t>
             </a:fld>
             <a:endParaRPr lang="en-US"/>
           </a:p>
@@ -916,7 +917,7 @@
           <a:p>
             <a:fld id="{CAD6E01A-BBAC-4444-B0EB-2834B74A04A6}" type="datetimeFigureOut">
               <a:rPr lang="en-US" smtClean="0"/>
-              <a:t>8/1/21</a:t>
+              <a:t>11/16/21</a:t>
             </a:fld>
             <a:endParaRPr lang="en-US"/>
           </a:p>
@@ -1096,7 +1097,7 @@
           <a:p>
             <a:fld id="{CAD6E01A-BBAC-4444-B0EB-2834B74A04A6}" type="datetimeFigureOut">
               <a:rPr lang="en-US" smtClean="0"/>
-              <a:t>8/1/21</a:t>
+              <a:t>11/16/21</a:t>
             </a:fld>
             <a:endParaRPr lang="en-US"/>
           </a:p>
@@ -1266,7 +1267,7 @@
           <a:p>
             <a:fld id="{CAD6E01A-BBAC-4444-B0EB-2834B74A04A6}" type="datetimeFigureOut">
               <a:rPr lang="en-US" smtClean="0"/>
-              <a:t>8/1/21</a:t>
+              <a:t>11/16/21</a:t>
             </a:fld>
             <a:endParaRPr lang="en-US"/>
           </a:p>
@@ -1512,7 +1513,7 @@
           <a:p>
             <a:fld id="{CAD6E01A-BBAC-4444-B0EB-2834B74A04A6}" type="datetimeFigureOut">
               <a:rPr lang="en-US" smtClean="0"/>
-              <a:t>8/1/21</a:t>
+              <a:t>11/16/21</a:t>
             </a:fld>
             <a:endParaRPr lang="en-US"/>
           </a:p>
@@ -1800,7 +1801,7 @@
           <a:p>
             <a:fld id="{CAD6E01A-BBAC-4444-B0EB-2834B74A04A6}" type="datetimeFigureOut">
               <a:rPr lang="en-US" smtClean="0"/>
-              <a:t>8/1/21</a:t>
+              <a:t>11/16/21</a:t>
             </a:fld>
             <a:endParaRPr lang="en-US"/>
           </a:p>
@@ -2222,7 +2223,7 @@
           <a:p>
             <a:fld id="{CAD6E01A-BBAC-4444-B0EB-2834B74A04A6}" type="datetimeFigureOut">
               <a:rPr lang="en-US" smtClean="0"/>
-              <a:t>8/1/21</a:t>
+              <a:t>11/16/21</a:t>
             </a:fld>
             <a:endParaRPr lang="en-US"/>
           </a:p>
@@ -2340,7 +2341,7 @@
           <a:p>
             <a:fld id="{CAD6E01A-BBAC-4444-B0EB-2834B74A04A6}" type="datetimeFigureOut">
               <a:rPr lang="en-US" smtClean="0"/>
-              <a:t>8/1/21</a:t>
+              <a:t>11/16/21</a:t>
             </a:fld>
             <a:endParaRPr lang="en-US"/>
           </a:p>
@@ -2435,7 +2436,7 @@
           <a:p>
             <a:fld id="{CAD6E01A-BBAC-4444-B0EB-2834B74A04A6}" type="datetimeFigureOut">
               <a:rPr lang="en-US" smtClean="0"/>
-              <a:t>8/1/21</a:t>
+              <a:t>11/16/21</a:t>
             </a:fld>
             <a:endParaRPr lang="en-US"/>
           </a:p>
@@ -2712,7 +2713,7 @@
           <a:p>
             <a:fld id="{CAD6E01A-BBAC-4444-B0EB-2834B74A04A6}" type="datetimeFigureOut">
               <a:rPr lang="en-US" smtClean="0"/>
-              <a:t>8/1/21</a:t>
+              <a:t>11/16/21</a:t>
             </a:fld>
             <a:endParaRPr lang="en-US"/>
           </a:p>
@@ -2965,7 +2966,7 @@
           <a:p>
             <a:fld id="{CAD6E01A-BBAC-4444-B0EB-2834B74A04A6}" type="datetimeFigureOut">
               <a:rPr lang="en-US" smtClean="0"/>
-              <a:t>8/1/21</a:t>
+              <a:t>11/16/21</a:t>
             </a:fld>
             <a:endParaRPr lang="en-US"/>
           </a:p>
@@ -3178,7 +3179,7 @@
           <a:p>
             <a:fld id="{CAD6E01A-BBAC-4444-B0EB-2834B74A04A6}" type="datetimeFigureOut">
               <a:rPr lang="en-US" smtClean="0"/>
-              <a:t>8/1/21</a:t>
+              <a:t>11/16/21</a:t>
             </a:fld>
             <a:endParaRPr lang="en-US"/>
           </a:p>
@@ -3595,29 +3596,12 @@
                   <a:srgbClr val="FF0000"/>
                 </a:solidFill>
               </a:rPr>
-              <a:t>Conflict resolution in distributed </a:t>
-            </a:r>
-            <a:r>
-              <a:rPr lang="en-US" sz="3600" b="1" dirty="0" smtClean="0">
-                <a:solidFill>
-                  <a:srgbClr val="FF0000"/>
-                </a:solidFill>
-              </a:rPr>
-              <a:t>systems</a:t>
+              <a:t>Conflict resolution in distributed systems</a:t>
             </a:r>
             <a:r>
               <a:rPr lang="en-US" sz="3600" dirty="0" smtClean="0"/>
-              <a:t>. </a:t>
-            </a:r>
-            <a:r>
-              <a:rPr lang="en-US" sz="3600" dirty="0" smtClean="0"/>
-              <a:t>Distributed Dining </a:t>
-            </a:r>
-            <a:r>
-              <a:rPr lang="en-US" sz="3600" dirty="0" smtClean="0"/>
-              <a:t>Philosophers: An example of mutual exclusion.</a:t>
-            </a:r>
-            <a:endParaRPr lang="en-US" sz="3600" dirty="0" smtClean="0"/>
+              <a:t>. Distributed Dining Philosophers: An example of mutual exclusion.</a:t>
+            </a:r>
           </a:p>
           <a:p>
             <a:pPr marL="457200" indent="-457200">
@@ -3656,15 +3640,7 @@
                   <a:srgbClr val="FF0000"/>
                 </a:solidFill>
               </a:rPr>
-              <a:t>T</a:t>
-            </a:r>
-            <a:r>
-              <a:rPr lang="en-US" sz="3600" b="1" dirty="0" smtClean="0">
-                <a:solidFill>
-                  <a:srgbClr val="FF0000"/>
-                </a:solidFill>
-              </a:rPr>
-              <a:t>okens</a:t>
+              <a:t>Tokens</a:t>
             </a:r>
             <a:r>
               <a:rPr lang="en-US" sz="3600" dirty="0" smtClean="0">
@@ -3676,13 +3652,8 @@
             </a:r>
             <a:r>
               <a:rPr lang="en-US" sz="3600" dirty="0" smtClean="0"/>
-              <a:t>An </a:t>
-            </a:r>
-            <a:r>
-              <a:rPr lang="en-US" sz="3600" dirty="0" smtClean="0"/>
-              <a:t>agent that holds a token that is not created or destroyed knows that other agents don’t hold the token.</a:t>
-            </a:r>
-            <a:endParaRPr lang="en-US" sz="3600" dirty="0" smtClean="0"/>
+              <a:t>An agent that holds a token that is not created or destroyed knows that other agents don’t hold the token.</a:t>
+            </a:r>
           </a:p>
         </p:txBody>
       </p:sp>
@@ -9064,15 +9035,7 @@
           <a:p>
             <a:r>
               <a:rPr lang="en-US" sz="2800" dirty="0" smtClean="0"/>
-              <a:t>Could </a:t>
-            </a:r>
-            <a:r>
-              <a:rPr lang="en-US" sz="2800" dirty="0" smtClean="0"/>
-              <a:t>a cabal of philosophers eat repeatedly and cause others to starve for ever? For example, could philosopher y remain hungry forever because u, v, w eat repeatedly, one after the other</a:t>
-            </a:r>
-            <a:r>
-              <a:rPr lang="en-US" sz="2800" dirty="0" smtClean="0"/>
-              <a:t>?</a:t>
+              <a:t>Could a cabal of philosophers eat repeatedly and cause others to starve for ever? For example, could philosopher y remain hungry forever because u, v, w eat repeatedly, one after the other?</a:t>
             </a:r>
           </a:p>
           <a:p>
@@ -9083,7 +9046,6 @@
               <a:rPr lang="en-US" sz="2800" dirty="0" smtClean="0"/>
               <a:t>Could hungry philosophers forever hold some, but not all, forks that they need to eat?</a:t>
             </a:r>
-            <a:endParaRPr lang="en-US" sz="2800" dirty="0" smtClean="0"/>
           </a:p>
         </p:txBody>
       </p:sp>
@@ -9149,15 +9111,7 @@
             </a:pPr>
             <a:r>
               <a:rPr lang="en-US" dirty="0" smtClean="0"/>
-              <a:t>To prove </a:t>
-            </a:r>
-            <a:r>
-              <a:rPr lang="en-US" dirty="0" smtClean="0"/>
-              <a:t>progress find </a:t>
-            </a:r>
-            <a:r>
-              <a:rPr lang="en-US" dirty="0" smtClean="0"/>
-              <a:t>a variant function f such that for all k:</a:t>
+              <a:t>To prove progress find a variant function f such that for all k:</a:t>
             </a:r>
             <a:endParaRPr lang="en-US" dirty="0"/>
           </a:p>
@@ -9668,7 +9622,6 @@
                 <a:rPr lang="en-US" sz="2400" dirty="0"/>
                 <a:t>v</a:t>
               </a:r>
-              <a:endParaRPr lang="en-US" sz="2400" dirty="0"/>
             </a:p>
           </p:txBody>
         </p:sp>
@@ -9997,7 +9950,6 @@
                 <a:rPr lang="en-US" sz="2400" dirty="0"/>
                 <a:t>H</a:t>
               </a:r>
-              <a:endParaRPr lang="en-US" sz="2400" dirty="0"/>
             </a:p>
           </p:txBody>
         </p:sp>
@@ -10608,7 +10560,6 @@
               <a:rPr lang="en-US" sz="2400" b="1" dirty="0" smtClean="0"/>
               <a:t> of vertices with paths to v</a:t>
             </a:r>
-            <a:endParaRPr lang="en-US" sz="2400" b="1" dirty="0" smtClean="0"/>
           </a:p>
         </p:txBody>
       </p:sp>
@@ -10636,11 +10587,7 @@
           <a:p>
             <a:r>
               <a:rPr lang="en-US" sz="2400" b="1" dirty="0" smtClean="0"/>
-              <a:t>E</a:t>
-            </a:r>
-            <a:r>
-              <a:rPr lang="en-US" sz="2400" b="1" dirty="0" smtClean="0"/>
-              <a:t>xample Priority Graph. </a:t>
+              <a:t>Example Priority Graph. </a:t>
             </a:r>
             <a:endParaRPr lang="en-US" sz="2400" b="1" dirty="0"/>
           </a:p>
@@ -10672,11 +10619,7 @@
             </a:r>
             <a:r>
               <a:rPr lang="en-US" sz="2400" dirty="0" smtClean="0"/>
-              <a:t>), </a:t>
-            </a:r>
-            <a:r>
-              <a:rPr lang="en-US" sz="2400" dirty="0" smtClean="0"/>
-              <a:t>the number of thinking and hungry philosophers with paths to v.</a:t>
+              <a:t>), the number of thinking and hungry philosophers with paths to v.</a:t>
             </a:r>
           </a:p>
           <a:p>
@@ -10847,7 +10790,6 @@
                 <a:rPr lang="en-US" sz="2400" dirty="0"/>
                 <a:t>y</a:t>
               </a:r>
-              <a:endParaRPr lang="en-US" sz="2400" dirty="0"/>
             </a:p>
           </p:txBody>
         </p:sp>
@@ -10942,7 +10884,6 @@
                 <a:rPr lang="en-US" sz="2400" dirty="0"/>
                 <a:t>v</a:t>
               </a:r>
-              <a:endParaRPr lang="en-US" sz="2400" dirty="0"/>
             </a:p>
           </p:txBody>
         </p:sp>
@@ -11271,7 +11212,6 @@
                 <a:rPr lang="en-US" sz="2400" dirty="0"/>
                 <a:t>H</a:t>
               </a:r>
-              <a:endParaRPr lang="en-US" sz="2400" dirty="0"/>
             </a:p>
           </p:txBody>
         </p:sp>
@@ -11540,7 +11480,6 @@
                 <a:rPr lang="en-US" sz="2400" dirty="0"/>
                 <a:t>y</a:t>
               </a:r>
-              <a:endParaRPr lang="en-US" sz="2400" dirty="0"/>
             </a:p>
           </p:txBody>
         </p:sp>
@@ -11635,7 +11574,6 @@
                 <a:rPr lang="en-US" sz="2400" dirty="0"/>
                 <a:t>v</a:t>
               </a:r>
-              <a:endParaRPr lang="en-US" sz="2400" dirty="0"/>
             </a:p>
           </p:txBody>
         </p:sp>
@@ -12117,7 +12055,6 @@
               <a:rPr lang="en-US" sz="2400" dirty="0"/>
               <a:t>v</a:t>
             </a:r>
-            <a:endParaRPr lang="en-US" sz="2400" dirty="0"/>
           </a:p>
         </p:txBody>
       </p:sp>
@@ -12366,7 +12303,6 @@
               <a:rPr lang="en-US" sz="2400" dirty="0"/>
               <a:t>v</a:t>
             </a:r>
-            <a:endParaRPr lang="en-US" sz="2400" dirty="0"/>
           </a:p>
         </p:txBody>
       </p:sp>
@@ -12907,29 +12843,12 @@
                   <a:srgbClr val="FF0000"/>
                 </a:solidFill>
               </a:rPr>
-              <a:t>Conflict resolution in distributed </a:t>
-            </a:r>
-            <a:r>
-              <a:rPr lang="en-US" sz="3600" b="1" dirty="0" smtClean="0">
-                <a:solidFill>
-                  <a:srgbClr val="FF0000"/>
-                </a:solidFill>
-              </a:rPr>
-              <a:t>systems</a:t>
+              <a:t>Conflict resolution in distributed systems</a:t>
             </a:r>
             <a:r>
               <a:rPr lang="en-US" sz="3600" dirty="0" smtClean="0"/>
-              <a:t>. </a:t>
-            </a:r>
-            <a:r>
-              <a:rPr lang="en-US" sz="3600" dirty="0" smtClean="0"/>
-              <a:t>Distributed Dining </a:t>
-            </a:r>
-            <a:r>
-              <a:rPr lang="en-US" sz="3600" dirty="0" smtClean="0"/>
-              <a:t>Philosophers: An example of mutual exclusion.</a:t>
-            </a:r>
-            <a:endParaRPr lang="en-US" sz="3600" dirty="0" smtClean="0"/>
+              <a:t>. Distributed Dining Philosophers: An example of mutual exclusion.</a:t>
+            </a:r>
           </a:p>
           <a:p>
             <a:pPr marL="457200" indent="-457200">
@@ -12968,15 +12887,7 @@
                   <a:srgbClr val="FF0000"/>
                 </a:solidFill>
               </a:rPr>
-              <a:t>T</a:t>
-            </a:r>
-            <a:r>
-              <a:rPr lang="en-US" sz="3600" b="1" dirty="0" smtClean="0">
-                <a:solidFill>
-                  <a:srgbClr val="FF0000"/>
-                </a:solidFill>
-              </a:rPr>
-              <a:t>okens</a:t>
+              <a:t>Tokens</a:t>
             </a:r>
             <a:r>
               <a:rPr lang="en-US" sz="3600" dirty="0" smtClean="0">
@@ -12988,13 +12899,8 @@
             </a:r>
             <a:r>
               <a:rPr lang="en-US" sz="3600" dirty="0" smtClean="0"/>
-              <a:t>An </a:t>
-            </a:r>
-            <a:r>
-              <a:rPr lang="en-US" sz="3600" dirty="0" smtClean="0"/>
-              <a:t>agent that holds a token that is not created or destroyed knows that other agents don’t hold the token.</a:t>
-            </a:r>
-            <a:endParaRPr lang="en-US" sz="3600" dirty="0" smtClean="0"/>
+              <a:t>An agent that holds a token that is not created or destroyed knows that other agents don’t hold the token.</a:t>
+            </a:r>
           </a:p>
         </p:txBody>
       </p:sp>
@@ -15195,7 +15101,6 @@
               <a:rPr lang="en-US" sz="3200" b="1" dirty="0" smtClean="0"/>
               <a:t>In all states reachable from initial states:</a:t>
             </a:r>
-            <a:endParaRPr lang="en-US" sz="3200" b="1" dirty="0" smtClean="0"/>
           </a:p>
           <a:p>
             <a:pPr marL="342900" indent="-342900">
@@ -19004,6 +18909,2183 @@
 </p:sld>
 </file>
 
+<file path=ppt/slides/slide23.xml><?xml version="1.0" encoding="utf-8"?>
+<p:sld xmlns:a="http://schemas.openxmlformats.org/drawingml/2006/main" xmlns:r="http://schemas.openxmlformats.org/officeDocument/2006/relationships" xmlns:p="http://schemas.openxmlformats.org/presentationml/2006/main">
+  <p:cSld>
+    <p:spTree>
+      <p:nvGrpSpPr>
+        <p:cNvPr id="1" name=""/>
+        <p:cNvGrpSpPr/>
+        <p:nvPr/>
+      </p:nvGrpSpPr>
+      <p:grpSpPr>
+        <a:xfrm>
+          <a:off x="0" y="0"/>
+          <a:ext cx="0" cy="0"/>
+          <a:chOff x="0" y="0"/>
+          <a:chExt cx="0" cy="0"/>
+        </a:xfrm>
+      </p:grpSpPr>
+      <p:sp>
+        <p:nvSpPr>
+          <p:cNvPr id="36866" name="Rectangle 2"/>
+          <p:cNvSpPr>
+            <a:spLocks noGrp="1" noChangeArrowheads="1"/>
+          </p:cNvSpPr>
+          <p:nvPr>
+            <p:ph type="title"/>
+          </p:nvPr>
+        </p:nvSpPr>
+        <p:spPr>
+          <a:xfrm>
+            <a:off x="441325" y="5696"/>
+            <a:ext cx="8229600" cy="1727480"/>
+          </a:xfrm>
+        </p:spPr>
+        <p:txBody>
+          <a:bodyPr>
+            <a:normAutofit/>
+          </a:bodyPr>
+          <a:lstStyle/>
+          <a:p>
+            <a:pPr eaLnBrk="1" hangingPunct="1"/>
+            <a:r>
+              <a:rPr lang="en-US" sz="2800" b="1" dirty="0" smtClean="0">
+                <a:latin typeface="Arial" charset="0"/>
+              </a:rPr>
+              <a:t/>
+            </a:r>
+            <a:br>
+              <a:rPr lang="en-US" sz="2800" b="1" dirty="0" smtClean="0">
+                <a:latin typeface="Arial" charset="0"/>
+              </a:rPr>
+            </a:br>
+            <a:r>
+              <a:rPr lang="en-US" sz="2800" b="1" dirty="0" smtClean="0">
+                <a:latin typeface="Arial" charset="0"/>
+              </a:rPr>
+              <a:t>OS State is a Reflection of its Client State</a:t>
+            </a:r>
+            <a:br>
+              <a:rPr lang="en-US" sz="2800" b="1" dirty="0" smtClean="0">
+                <a:latin typeface="Arial" charset="0"/>
+              </a:rPr>
+            </a:br>
+            <a:endParaRPr lang="en-US" sz="2800" b="1" dirty="0">
+              <a:latin typeface="Arial" charset="0"/>
+            </a:endParaRPr>
+          </a:p>
+        </p:txBody>
+      </p:sp>
+      <p:sp>
+        <p:nvSpPr>
+          <p:cNvPr id="36867" name="Oval 3"/>
+          <p:cNvSpPr>
+            <a:spLocks noChangeAspect="1" noChangeArrowheads="1"/>
+          </p:cNvSpPr>
+          <p:nvPr/>
+        </p:nvSpPr>
+        <p:spPr bwMode="auto">
+          <a:xfrm>
+            <a:off x="914400" y="2885696"/>
+            <a:ext cx="1828800" cy="1828800"/>
+          </a:xfrm>
+          <a:prstGeom prst="ellipse">
+            <a:avLst/>
+          </a:prstGeom>
+          <a:noFill/>
+          <a:ln w="9525">
+            <a:solidFill>
+              <a:schemeClr val="tx1"/>
+            </a:solidFill>
+            <a:round/>
+            <a:headEnd/>
+            <a:tailEnd/>
+          </a:ln>
+          <a:extLst>
+            <a:ext uri="{909E8E84-426E-40dd-AFC4-6F175D3DCCD1}">
+              <a14:hiddenFill xmlns:a14="http://schemas.microsoft.com/office/drawing/2010/main">
+                <a:solidFill>
+                  <a:srgbClr val="FFFFFF"/>
+                </a:solidFill>
+              </a14:hiddenFill>
+            </a:ext>
+          </a:extLst>
+        </p:spPr>
+        <p:txBody>
+          <a:bodyPr wrap="none" anchor="ctr"/>
+          <a:lstStyle/>
+          <a:p>
+            <a:pPr algn="ctr"/>
+            <a:r>
+              <a:rPr lang="en-US" sz="1600"/>
+              <a:t>executing outside </a:t>
+            </a:r>
+          </a:p>
+          <a:p>
+            <a:pPr algn="ctr"/>
+            <a:r>
+              <a:rPr lang="en-US" sz="1600"/>
+              <a:t>critical section</a:t>
+            </a:r>
+          </a:p>
+          <a:p>
+            <a:pPr algn="ctr"/>
+            <a:endParaRPr lang="en-US" sz="1600"/>
+          </a:p>
+        </p:txBody>
+      </p:sp>
+      <p:sp>
+        <p:nvSpPr>
+          <p:cNvPr id="36868" name="Oval 4"/>
+          <p:cNvSpPr>
+            <a:spLocks noChangeAspect="1" noChangeArrowheads="1"/>
+          </p:cNvSpPr>
+          <p:nvPr/>
+        </p:nvSpPr>
+        <p:spPr bwMode="auto">
+          <a:xfrm>
+            <a:off x="3657600" y="2885696"/>
+            <a:ext cx="1828800" cy="1828800"/>
+          </a:xfrm>
+          <a:prstGeom prst="ellipse">
+            <a:avLst/>
+          </a:prstGeom>
+          <a:noFill/>
+          <a:ln w="9525">
+            <a:solidFill>
+              <a:schemeClr val="tx1"/>
+            </a:solidFill>
+            <a:round/>
+            <a:headEnd/>
+            <a:tailEnd/>
+          </a:ln>
+          <a:extLst>
+            <a:ext uri="{909E8E84-426E-40dd-AFC4-6F175D3DCCD1}">
+              <a14:hiddenFill xmlns:a14="http://schemas.microsoft.com/office/drawing/2010/main">
+                <a:solidFill>
+                  <a:srgbClr val="FFFFFF"/>
+                </a:solidFill>
+              </a14:hiddenFill>
+            </a:ext>
+          </a:extLst>
+        </p:spPr>
+        <p:txBody>
+          <a:bodyPr wrap="none" anchor="ctr"/>
+          <a:lstStyle/>
+          <a:p>
+            <a:pPr algn="ctr"/>
+            <a:r>
+              <a:rPr lang="en-US" sz="1600" dirty="0" smtClean="0"/>
+              <a:t>Waiting to enter </a:t>
+            </a:r>
+          </a:p>
+          <a:p>
+            <a:pPr algn="ctr"/>
+            <a:r>
+              <a:rPr lang="en-US" sz="1600" dirty="0" smtClean="0"/>
+              <a:t>critical section</a:t>
+            </a:r>
+            <a:endParaRPr lang="en-US" sz="1600" dirty="0"/>
+          </a:p>
+        </p:txBody>
+      </p:sp>
+      <p:sp>
+        <p:nvSpPr>
+          <p:cNvPr id="36869" name="Oval 5"/>
+          <p:cNvSpPr>
+            <a:spLocks noChangeAspect="1" noChangeArrowheads="1"/>
+          </p:cNvSpPr>
+          <p:nvPr/>
+        </p:nvSpPr>
+        <p:spPr bwMode="auto">
+          <a:xfrm>
+            <a:off x="6400800" y="2885696"/>
+            <a:ext cx="1828800" cy="1828800"/>
+          </a:xfrm>
+          <a:prstGeom prst="ellipse">
+            <a:avLst/>
+          </a:prstGeom>
+          <a:noFill/>
+          <a:ln w="9525">
+            <a:solidFill>
+              <a:schemeClr val="tx1"/>
+            </a:solidFill>
+            <a:round/>
+            <a:headEnd/>
+            <a:tailEnd/>
+          </a:ln>
+          <a:extLst>
+            <a:ext uri="{909E8E84-426E-40dd-AFC4-6F175D3DCCD1}">
+              <a14:hiddenFill xmlns:a14="http://schemas.microsoft.com/office/drawing/2010/main">
+                <a:solidFill>
+                  <a:srgbClr val="FFFFFF"/>
+                </a:solidFill>
+              </a14:hiddenFill>
+            </a:ext>
+          </a:extLst>
+        </p:spPr>
+        <p:txBody>
+          <a:bodyPr wrap="none" anchor="ctr"/>
+          <a:lstStyle/>
+          <a:p>
+            <a:pPr algn="ctr"/>
+            <a:r>
+              <a:rPr lang="en-US" sz="1800" dirty="0"/>
+              <a:t>executing </a:t>
+            </a:r>
+            <a:r>
+              <a:rPr lang="en-US" sz="1800" dirty="0" smtClean="0"/>
+              <a:t>in</a:t>
+            </a:r>
+            <a:endParaRPr lang="en-US" sz="1800" dirty="0"/>
+          </a:p>
+          <a:p>
+            <a:pPr algn="ctr"/>
+            <a:r>
+              <a:rPr lang="en-US" sz="1800" dirty="0"/>
+              <a:t>critical </a:t>
+            </a:r>
+          </a:p>
+          <a:p>
+            <a:pPr algn="ctr"/>
+            <a:r>
+              <a:rPr lang="en-US" sz="1800" dirty="0" smtClean="0"/>
+              <a:t>section</a:t>
+            </a:r>
+            <a:endParaRPr lang="en-US" sz="1800" dirty="0"/>
+          </a:p>
+        </p:txBody>
+      </p:sp>
+      <p:cxnSp>
+        <p:nvCxnSpPr>
+          <p:cNvPr id="36870" name="AutoShape 6"/>
+          <p:cNvCxnSpPr>
+            <a:cxnSpLocks noChangeShapeType="1"/>
+            <a:stCxn id="36867" idx="6"/>
+            <a:endCxn id="36868" idx="2"/>
+          </p:cNvCxnSpPr>
+          <p:nvPr/>
+        </p:nvCxnSpPr>
+        <p:spPr bwMode="auto">
+          <a:xfrm>
+            <a:off x="2743200" y="3800096"/>
+            <a:ext cx="914400" cy="0"/>
+          </a:xfrm>
+          <a:prstGeom prst="straightConnector1">
+            <a:avLst/>
+          </a:prstGeom>
+          <a:noFill/>
+          <a:ln w="76200">
+            <a:solidFill>
+              <a:schemeClr val="tx1"/>
+            </a:solidFill>
+            <a:round/>
+            <a:headEnd/>
+            <a:tailEnd type="triangle" w="med" len="med"/>
+          </a:ln>
+          <a:extLst>
+            <a:ext uri="{909E8E84-426E-40dd-AFC4-6F175D3DCCD1}">
+              <a14:hiddenFill xmlns:a14="http://schemas.microsoft.com/office/drawing/2010/main">
+                <a:noFill/>
+              </a14:hiddenFill>
+            </a:ext>
+          </a:extLst>
+        </p:spPr>
+      </p:cxnSp>
+      <p:cxnSp>
+        <p:nvCxnSpPr>
+          <p:cNvPr id="36871" name="AutoShape 7"/>
+          <p:cNvCxnSpPr>
+            <a:cxnSpLocks noChangeShapeType="1"/>
+            <a:stCxn id="36869" idx="6"/>
+            <a:endCxn id="36867" idx="2"/>
+          </p:cNvCxnSpPr>
+          <p:nvPr/>
+        </p:nvCxnSpPr>
+        <p:spPr bwMode="auto">
+          <a:xfrm flipH="1">
+            <a:off x="914400" y="3800096"/>
+            <a:ext cx="7315200" cy="1588"/>
+          </a:xfrm>
+          <a:prstGeom prst="curvedConnector5">
+            <a:avLst>
+              <a:gd name="adj1" fmla="val -3125"/>
+              <a:gd name="adj2" fmla="val -116700000"/>
+              <a:gd name="adj3" fmla="val 103125"/>
+            </a:avLst>
+          </a:prstGeom>
+          <a:noFill/>
+          <a:ln w="76200">
+            <a:solidFill>
+              <a:schemeClr val="tx1"/>
+            </a:solidFill>
+            <a:round/>
+            <a:headEnd/>
+            <a:tailEnd type="triangle" w="med" len="med"/>
+          </a:ln>
+          <a:extLst>
+            <a:ext uri="{909E8E84-426E-40dd-AFC4-6F175D3DCCD1}">
+              <a14:hiddenFill xmlns:a14="http://schemas.microsoft.com/office/drawing/2010/main">
+                <a:noFill/>
+              </a14:hiddenFill>
+            </a:ext>
+          </a:extLst>
+        </p:spPr>
+      </p:cxnSp>
+      <p:sp>
+        <p:nvSpPr>
+          <p:cNvPr id="36873" name="Line 9"/>
+          <p:cNvSpPr>
+            <a:spLocks noChangeShapeType="1"/>
+          </p:cNvSpPr>
+          <p:nvPr/>
+        </p:nvSpPr>
+        <p:spPr bwMode="auto">
+          <a:xfrm flipV="1">
+            <a:off x="3200400" y="3800096"/>
+            <a:ext cx="0" cy="1306689"/>
+          </a:xfrm>
+          <a:prstGeom prst="line">
+            <a:avLst/>
+          </a:prstGeom>
+          <a:noFill/>
+          <a:ln w="9525">
+            <a:solidFill>
+              <a:schemeClr val="tx1"/>
+            </a:solidFill>
+            <a:prstDash val="dash"/>
+            <a:round/>
+            <a:headEnd/>
+            <a:tailEnd type="triangle" w="med" len="med"/>
+          </a:ln>
+          <a:extLst>
+            <a:ext uri="{909E8E84-426E-40dd-AFC4-6F175D3DCCD1}">
+              <a14:hiddenFill xmlns:a14="http://schemas.microsoft.com/office/drawing/2010/main">
+                <a:noFill/>
+              </a14:hiddenFill>
+            </a:ext>
+          </a:extLst>
+        </p:spPr>
+        <p:txBody>
+          <a:bodyPr/>
+          <a:lstStyle/>
+          <a:p>
+            <a:endParaRPr lang="en-US"/>
+          </a:p>
+        </p:txBody>
+      </p:sp>
+      <p:sp>
+        <p:nvSpPr>
+          <p:cNvPr id="36877" name="Text Box 13"/>
+          <p:cNvSpPr txBox="1">
+            <a:spLocks noChangeArrowheads="1"/>
+          </p:cNvSpPr>
+          <p:nvPr/>
+        </p:nvSpPr>
+        <p:spPr bwMode="auto">
+          <a:xfrm>
+            <a:off x="847243" y="4830384"/>
+            <a:ext cx="1872628" cy="461665"/>
+          </a:xfrm>
+          <a:prstGeom prst="rect">
+            <a:avLst/>
+          </a:prstGeom>
+          <a:noFill/>
+          <a:ln>
+            <a:noFill/>
+          </a:ln>
+          <a:extLst>
+            <a:ext uri="{909E8E84-426E-40dd-AFC4-6F175D3DCCD1}">
+              <a14:hiddenFill xmlns:a14="http://schemas.microsoft.com/office/drawing/2010/main">
+                <a:solidFill>
+                  <a:srgbClr val="FFFFFF"/>
+                </a:solidFill>
+              </a14:hiddenFill>
+            </a:ext>
+            <a:ext uri="{91240B29-F687-4f45-9708-019B960494DF}">
+              <a14:hiddenLine xmlns:a14="http://schemas.microsoft.com/office/drawing/2010/main" w="9525">
+                <a:solidFill>
+                  <a:srgbClr val="000000"/>
+                </a:solidFill>
+                <a:miter lim="800000"/>
+                <a:headEnd/>
+                <a:tailEnd/>
+              </a14:hiddenLine>
+            </a:ext>
+          </a:extLst>
+        </p:spPr>
+        <p:txBody>
+          <a:bodyPr wrap="none">
+            <a:spAutoFit/>
+          </a:bodyPr>
+          <a:lstStyle>
+            <a:lvl1pPr eaLnBrk="0" hangingPunct="0">
+              <a:defRPr sz="2400">
+                <a:solidFill>
+                  <a:schemeClr val="tx1"/>
+                </a:solidFill>
+                <a:latin typeface="Arial" charset="0"/>
+                <a:ea typeface="ＭＳ Ｐゴシック" charset="0"/>
+                <a:cs typeface="ＭＳ Ｐゴシック" charset="0"/>
+              </a:defRPr>
+            </a:lvl1pPr>
+            <a:lvl2pPr marL="742950" indent="-285750" eaLnBrk="0" hangingPunct="0">
+              <a:defRPr sz="2400">
+                <a:solidFill>
+                  <a:schemeClr val="tx1"/>
+                </a:solidFill>
+                <a:latin typeface="Arial" charset="0"/>
+                <a:ea typeface="ＭＳ Ｐゴシック" charset="0"/>
+              </a:defRPr>
+            </a:lvl2pPr>
+            <a:lvl3pPr marL="1143000" indent="-228600" eaLnBrk="0" hangingPunct="0">
+              <a:defRPr sz="2400">
+                <a:solidFill>
+                  <a:schemeClr val="tx1"/>
+                </a:solidFill>
+                <a:latin typeface="Arial" charset="0"/>
+                <a:ea typeface="ＭＳ Ｐゴシック" charset="0"/>
+              </a:defRPr>
+            </a:lvl3pPr>
+            <a:lvl4pPr marL="1600200" indent="-228600" eaLnBrk="0" hangingPunct="0">
+              <a:defRPr sz="2400">
+                <a:solidFill>
+                  <a:schemeClr val="tx1"/>
+                </a:solidFill>
+                <a:latin typeface="Arial" charset="0"/>
+                <a:ea typeface="ＭＳ Ｐゴシック" charset="0"/>
+              </a:defRPr>
+            </a:lvl4pPr>
+            <a:lvl5pPr marL="2057400" indent="-228600" eaLnBrk="0" hangingPunct="0">
+              <a:defRPr sz="2400">
+                <a:solidFill>
+                  <a:schemeClr val="tx1"/>
+                </a:solidFill>
+                <a:latin typeface="Arial" charset="0"/>
+                <a:ea typeface="ＭＳ Ｐゴシック" charset="0"/>
+              </a:defRPr>
+            </a:lvl5pPr>
+            <a:lvl6pPr marL="2514600" indent="-228600" eaLnBrk="0" fontAlgn="base" hangingPunct="0">
+              <a:spcBef>
+                <a:spcPct val="0"/>
+              </a:spcBef>
+              <a:spcAft>
+                <a:spcPct val="0"/>
+              </a:spcAft>
+              <a:defRPr sz="2400">
+                <a:solidFill>
+                  <a:schemeClr val="tx1"/>
+                </a:solidFill>
+                <a:latin typeface="Arial" charset="0"/>
+                <a:ea typeface="ＭＳ Ｐゴシック" charset="0"/>
+              </a:defRPr>
+            </a:lvl6pPr>
+            <a:lvl7pPr marL="2971800" indent="-228600" eaLnBrk="0" fontAlgn="base" hangingPunct="0">
+              <a:spcBef>
+                <a:spcPct val="0"/>
+              </a:spcBef>
+              <a:spcAft>
+                <a:spcPct val="0"/>
+              </a:spcAft>
+              <a:defRPr sz="2400">
+                <a:solidFill>
+                  <a:schemeClr val="tx1"/>
+                </a:solidFill>
+                <a:latin typeface="Arial" charset="0"/>
+                <a:ea typeface="ＭＳ Ｐゴシック" charset="0"/>
+              </a:defRPr>
+            </a:lvl7pPr>
+            <a:lvl8pPr marL="3429000" indent="-228600" eaLnBrk="0" fontAlgn="base" hangingPunct="0">
+              <a:spcBef>
+                <a:spcPct val="0"/>
+              </a:spcBef>
+              <a:spcAft>
+                <a:spcPct val="0"/>
+              </a:spcAft>
+              <a:defRPr sz="2400">
+                <a:solidFill>
+                  <a:schemeClr val="tx1"/>
+                </a:solidFill>
+                <a:latin typeface="Arial" charset="0"/>
+                <a:ea typeface="ＭＳ Ｐゴシック" charset="0"/>
+              </a:defRPr>
+            </a:lvl8pPr>
+            <a:lvl9pPr marL="3886200" indent="-228600" eaLnBrk="0" fontAlgn="base" hangingPunct="0">
+              <a:spcBef>
+                <a:spcPct val="0"/>
+              </a:spcBef>
+              <a:spcAft>
+                <a:spcPct val="0"/>
+              </a:spcAft>
+              <a:defRPr sz="2400">
+                <a:solidFill>
+                  <a:schemeClr val="tx1"/>
+                </a:solidFill>
+                <a:latin typeface="Arial" charset="0"/>
+                <a:ea typeface="ＭＳ Ｐゴシック" charset="0"/>
+              </a:defRPr>
+            </a:lvl9pPr>
+          </a:lstStyle>
+          <a:p>
+            <a:pPr algn="ctr" eaLnBrk="1" hangingPunct="1"/>
+            <a:r>
+              <a:rPr lang="en-US" dirty="0" smtClean="0"/>
+              <a:t>OS Thinking</a:t>
+            </a:r>
+            <a:endParaRPr lang="en-US" dirty="0"/>
+          </a:p>
+        </p:txBody>
+      </p:sp>
+      <p:sp>
+        <p:nvSpPr>
+          <p:cNvPr id="36878" name="Text Box 14"/>
+          <p:cNvSpPr txBox="1">
+            <a:spLocks noChangeArrowheads="1"/>
+          </p:cNvSpPr>
+          <p:nvPr/>
+        </p:nvSpPr>
+        <p:spPr bwMode="auto">
+          <a:xfrm>
+            <a:off x="4064000" y="4790696"/>
+            <a:ext cx="1168400" cy="457200"/>
+          </a:xfrm>
+          <a:prstGeom prst="rect">
+            <a:avLst/>
+          </a:prstGeom>
+          <a:noFill/>
+          <a:ln>
+            <a:noFill/>
+          </a:ln>
+          <a:extLst>
+            <a:ext uri="{909E8E84-426E-40dd-AFC4-6F175D3DCCD1}">
+              <a14:hiddenFill xmlns:a14="http://schemas.microsoft.com/office/drawing/2010/main">
+                <a:solidFill>
+                  <a:srgbClr val="FFFFFF"/>
+                </a:solidFill>
+              </a14:hiddenFill>
+            </a:ext>
+            <a:ext uri="{91240B29-F687-4f45-9708-019B960494DF}">
+              <a14:hiddenLine xmlns:a14="http://schemas.microsoft.com/office/drawing/2010/main" w="9525">
+                <a:solidFill>
+                  <a:srgbClr val="000000"/>
+                </a:solidFill>
+                <a:miter lim="800000"/>
+                <a:headEnd/>
+                <a:tailEnd/>
+              </a14:hiddenLine>
+            </a:ext>
+          </a:extLst>
+        </p:spPr>
+        <p:txBody>
+          <a:bodyPr wrap="none">
+            <a:spAutoFit/>
+          </a:bodyPr>
+          <a:lstStyle>
+            <a:lvl1pPr eaLnBrk="0" hangingPunct="0">
+              <a:defRPr sz="2400">
+                <a:solidFill>
+                  <a:schemeClr val="tx1"/>
+                </a:solidFill>
+                <a:latin typeface="Arial" charset="0"/>
+                <a:ea typeface="ＭＳ Ｐゴシック" charset="0"/>
+                <a:cs typeface="ＭＳ Ｐゴシック" charset="0"/>
+              </a:defRPr>
+            </a:lvl1pPr>
+            <a:lvl2pPr marL="742950" indent="-285750" eaLnBrk="0" hangingPunct="0">
+              <a:defRPr sz="2400">
+                <a:solidFill>
+                  <a:schemeClr val="tx1"/>
+                </a:solidFill>
+                <a:latin typeface="Arial" charset="0"/>
+                <a:ea typeface="ＭＳ Ｐゴシック" charset="0"/>
+              </a:defRPr>
+            </a:lvl2pPr>
+            <a:lvl3pPr marL="1143000" indent="-228600" eaLnBrk="0" hangingPunct="0">
+              <a:defRPr sz="2400">
+                <a:solidFill>
+                  <a:schemeClr val="tx1"/>
+                </a:solidFill>
+                <a:latin typeface="Arial" charset="0"/>
+                <a:ea typeface="ＭＳ Ｐゴシック" charset="0"/>
+              </a:defRPr>
+            </a:lvl3pPr>
+            <a:lvl4pPr marL="1600200" indent="-228600" eaLnBrk="0" hangingPunct="0">
+              <a:defRPr sz="2400">
+                <a:solidFill>
+                  <a:schemeClr val="tx1"/>
+                </a:solidFill>
+                <a:latin typeface="Arial" charset="0"/>
+                <a:ea typeface="ＭＳ Ｐゴシック" charset="0"/>
+              </a:defRPr>
+            </a:lvl4pPr>
+            <a:lvl5pPr marL="2057400" indent="-228600" eaLnBrk="0" hangingPunct="0">
+              <a:defRPr sz="2400">
+                <a:solidFill>
+                  <a:schemeClr val="tx1"/>
+                </a:solidFill>
+                <a:latin typeface="Arial" charset="0"/>
+                <a:ea typeface="ＭＳ Ｐゴシック" charset="0"/>
+              </a:defRPr>
+            </a:lvl5pPr>
+            <a:lvl6pPr marL="2514600" indent="-228600" eaLnBrk="0" fontAlgn="base" hangingPunct="0">
+              <a:spcBef>
+                <a:spcPct val="0"/>
+              </a:spcBef>
+              <a:spcAft>
+                <a:spcPct val="0"/>
+              </a:spcAft>
+              <a:defRPr sz="2400">
+                <a:solidFill>
+                  <a:schemeClr val="tx1"/>
+                </a:solidFill>
+                <a:latin typeface="Arial" charset="0"/>
+                <a:ea typeface="ＭＳ Ｐゴシック" charset="0"/>
+              </a:defRPr>
+            </a:lvl6pPr>
+            <a:lvl7pPr marL="2971800" indent="-228600" eaLnBrk="0" fontAlgn="base" hangingPunct="0">
+              <a:spcBef>
+                <a:spcPct val="0"/>
+              </a:spcBef>
+              <a:spcAft>
+                <a:spcPct val="0"/>
+              </a:spcAft>
+              <a:defRPr sz="2400">
+                <a:solidFill>
+                  <a:schemeClr val="tx1"/>
+                </a:solidFill>
+                <a:latin typeface="Arial" charset="0"/>
+                <a:ea typeface="ＭＳ Ｐゴシック" charset="0"/>
+              </a:defRPr>
+            </a:lvl7pPr>
+            <a:lvl8pPr marL="3429000" indent="-228600" eaLnBrk="0" fontAlgn="base" hangingPunct="0">
+              <a:spcBef>
+                <a:spcPct val="0"/>
+              </a:spcBef>
+              <a:spcAft>
+                <a:spcPct val="0"/>
+              </a:spcAft>
+              <a:defRPr sz="2400">
+                <a:solidFill>
+                  <a:schemeClr val="tx1"/>
+                </a:solidFill>
+                <a:latin typeface="Arial" charset="0"/>
+                <a:ea typeface="ＭＳ Ｐゴシック" charset="0"/>
+              </a:defRPr>
+            </a:lvl8pPr>
+            <a:lvl9pPr marL="3886200" indent="-228600" eaLnBrk="0" fontAlgn="base" hangingPunct="0">
+              <a:spcBef>
+                <a:spcPct val="0"/>
+              </a:spcBef>
+              <a:spcAft>
+                <a:spcPct val="0"/>
+              </a:spcAft>
+              <a:defRPr sz="2400">
+                <a:solidFill>
+                  <a:schemeClr val="tx1"/>
+                </a:solidFill>
+                <a:latin typeface="Arial" charset="0"/>
+                <a:ea typeface="ＭＳ Ｐゴシック" charset="0"/>
+              </a:defRPr>
+            </a:lvl9pPr>
+          </a:lstStyle>
+          <a:p>
+            <a:pPr eaLnBrk="1" hangingPunct="1"/>
+            <a:r>
+              <a:rPr lang="en-US"/>
+              <a:t>Hungry</a:t>
+            </a:r>
+          </a:p>
+        </p:txBody>
+      </p:sp>
+      <p:sp>
+        <p:nvSpPr>
+          <p:cNvPr id="36879" name="Text Box 15"/>
+          <p:cNvSpPr txBox="1">
+            <a:spLocks noChangeArrowheads="1"/>
+          </p:cNvSpPr>
+          <p:nvPr/>
+        </p:nvSpPr>
+        <p:spPr bwMode="auto">
+          <a:xfrm>
+            <a:off x="6858000" y="4866896"/>
+            <a:ext cx="1295400" cy="457200"/>
+          </a:xfrm>
+          <a:prstGeom prst="rect">
+            <a:avLst/>
+          </a:prstGeom>
+          <a:noFill/>
+          <a:ln>
+            <a:noFill/>
+          </a:ln>
+          <a:extLst>
+            <a:ext uri="{909E8E84-426E-40dd-AFC4-6F175D3DCCD1}">
+              <a14:hiddenFill xmlns:a14="http://schemas.microsoft.com/office/drawing/2010/main">
+                <a:solidFill>
+                  <a:srgbClr val="FFFFFF"/>
+                </a:solidFill>
+              </a14:hiddenFill>
+            </a:ext>
+            <a:ext uri="{91240B29-F687-4f45-9708-019B960494DF}">
+              <a14:hiddenLine xmlns:a14="http://schemas.microsoft.com/office/drawing/2010/main" w="9525">
+                <a:solidFill>
+                  <a:srgbClr val="000000"/>
+                </a:solidFill>
+                <a:miter lim="800000"/>
+                <a:headEnd/>
+                <a:tailEnd/>
+              </a14:hiddenLine>
+            </a:ext>
+          </a:extLst>
+        </p:spPr>
+        <p:txBody>
+          <a:bodyPr>
+            <a:spAutoFit/>
+          </a:bodyPr>
+          <a:lstStyle>
+            <a:lvl1pPr eaLnBrk="0" hangingPunct="0">
+              <a:defRPr sz="2400">
+                <a:solidFill>
+                  <a:schemeClr val="tx1"/>
+                </a:solidFill>
+                <a:latin typeface="Arial" charset="0"/>
+                <a:ea typeface="ＭＳ Ｐゴシック" charset="0"/>
+                <a:cs typeface="ＭＳ Ｐゴシック" charset="0"/>
+              </a:defRPr>
+            </a:lvl1pPr>
+            <a:lvl2pPr marL="742950" indent="-285750" eaLnBrk="0" hangingPunct="0">
+              <a:defRPr sz="2400">
+                <a:solidFill>
+                  <a:schemeClr val="tx1"/>
+                </a:solidFill>
+                <a:latin typeface="Arial" charset="0"/>
+                <a:ea typeface="ＭＳ Ｐゴシック" charset="0"/>
+              </a:defRPr>
+            </a:lvl2pPr>
+            <a:lvl3pPr marL="1143000" indent="-228600" eaLnBrk="0" hangingPunct="0">
+              <a:defRPr sz="2400">
+                <a:solidFill>
+                  <a:schemeClr val="tx1"/>
+                </a:solidFill>
+                <a:latin typeface="Arial" charset="0"/>
+                <a:ea typeface="ＭＳ Ｐゴシック" charset="0"/>
+              </a:defRPr>
+            </a:lvl3pPr>
+            <a:lvl4pPr marL="1600200" indent="-228600" eaLnBrk="0" hangingPunct="0">
+              <a:defRPr sz="2400">
+                <a:solidFill>
+                  <a:schemeClr val="tx1"/>
+                </a:solidFill>
+                <a:latin typeface="Arial" charset="0"/>
+                <a:ea typeface="ＭＳ Ｐゴシック" charset="0"/>
+              </a:defRPr>
+            </a:lvl4pPr>
+            <a:lvl5pPr marL="2057400" indent="-228600" eaLnBrk="0" hangingPunct="0">
+              <a:defRPr sz="2400">
+                <a:solidFill>
+                  <a:schemeClr val="tx1"/>
+                </a:solidFill>
+                <a:latin typeface="Arial" charset="0"/>
+                <a:ea typeface="ＭＳ Ｐゴシック" charset="0"/>
+              </a:defRPr>
+            </a:lvl5pPr>
+            <a:lvl6pPr marL="2514600" indent="-228600" eaLnBrk="0" fontAlgn="base" hangingPunct="0">
+              <a:spcBef>
+                <a:spcPct val="0"/>
+              </a:spcBef>
+              <a:spcAft>
+                <a:spcPct val="0"/>
+              </a:spcAft>
+              <a:defRPr sz="2400">
+                <a:solidFill>
+                  <a:schemeClr val="tx1"/>
+                </a:solidFill>
+                <a:latin typeface="Arial" charset="0"/>
+                <a:ea typeface="ＭＳ Ｐゴシック" charset="0"/>
+              </a:defRPr>
+            </a:lvl6pPr>
+            <a:lvl7pPr marL="2971800" indent="-228600" eaLnBrk="0" fontAlgn="base" hangingPunct="0">
+              <a:spcBef>
+                <a:spcPct val="0"/>
+              </a:spcBef>
+              <a:spcAft>
+                <a:spcPct val="0"/>
+              </a:spcAft>
+              <a:defRPr sz="2400">
+                <a:solidFill>
+                  <a:schemeClr val="tx1"/>
+                </a:solidFill>
+                <a:latin typeface="Arial" charset="0"/>
+                <a:ea typeface="ＭＳ Ｐゴシック" charset="0"/>
+              </a:defRPr>
+            </a:lvl7pPr>
+            <a:lvl8pPr marL="3429000" indent="-228600" eaLnBrk="0" fontAlgn="base" hangingPunct="0">
+              <a:spcBef>
+                <a:spcPct val="0"/>
+              </a:spcBef>
+              <a:spcAft>
+                <a:spcPct val="0"/>
+              </a:spcAft>
+              <a:defRPr sz="2400">
+                <a:solidFill>
+                  <a:schemeClr val="tx1"/>
+                </a:solidFill>
+                <a:latin typeface="Arial" charset="0"/>
+                <a:ea typeface="ＭＳ Ｐゴシック" charset="0"/>
+              </a:defRPr>
+            </a:lvl8pPr>
+            <a:lvl9pPr marL="3886200" indent="-228600" eaLnBrk="0" fontAlgn="base" hangingPunct="0">
+              <a:spcBef>
+                <a:spcPct val="0"/>
+              </a:spcBef>
+              <a:spcAft>
+                <a:spcPct val="0"/>
+              </a:spcAft>
+              <a:defRPr sz="2400">
+                <a:solidFill>
+                  <a:schemeClr val="tx1"/>
+                </a:solidFill>
+                <a:latin typeface="Arial" charset="0"/>
+                <a:ea typeface="ＭＳ Ｐゴシック" charset="0"/>
+              </a:defRPr>
+            </a:lvl9pPr>
+          </a:lstStyle>
+          <a:p>
+            <a:pPr eaLnBrk="1" hangingPunct="1"/>
+            <a:r>
+              <a:rPr lang="en-US"/>
+              <a:t>Eating</a:t>
+            </a:r>
+          </a:p>
+        </p:txBody>
+      </p:sp>
+      <p:cxnSp>
+        <p:nvCxnSpPr>
+          <p:cNvPr id="36880" name="AutoShape 16"/>
+          <p:cNvCxnSpPr>
+            <a:cxnSpLocks noChangeShapeType="1"/>
+            <a:stCxn id="36868" idx="6"/>
+            <a:endCxn id="36869" idx="2"/>
+          </p:cNvCxnSpPr>
+          <p:nvPr/>
+        </p:nvCxnSpPr>
+        <p:spPr bwMode="auto">
+          <a:xfrm>
+            <a:off x="5486400" y="3800096"/>
+            <a:ext cx="914400" cy="0"/>
+          </a:xfrm>
+          <a:prstGeom prst="straightConnector1">
+            <a:avLst/>
+          </a:prstGeom>
+          <a:noFill/>
+          <a:ln w="76200">
+            <a:solidFill>
+              <a:schemeClr val="tx1"/>
+            </a:solidFill>
+            <a:round/>
+            <a:headEnd/>
+            <a:tailEnd type="triangle" w="med" len="med"/>
+          </a:ln>
+          <a:extLst>
+            <a:ext uri="{909E8E84-426E-40dd-AFC4-6F175D3DCCD1}">
+              <a14:hiddenFill xmlns:a14="http://schemas.microsoft.com/office/drawing/2010/main">
+                <a:noFill/>
+              </a14:hiddenFill>
+            </a:ext>
+          </a:extLst>
+        </p:spPr>
+      </p:cxnSp>
+      <p:sp>
+        <p:nvSpPr>
+          <p:cNvPr id="25" name="Line 9"/>
+          <p:cNvSpPr>
+            <a:spLocks noChangeShapeType="1"/>
+          </p:cNvSpPr>
+          <p:nvPr/>
+        </p:nvSpPr>
+        <p:spPr bwMode="auto">
+          <a:xfrm flipV="1">
+            <a:off x="5967506" y="3800095"/>
+            <a:ext cx="0" cy="1306690"/>
+          </a:xfrm>
+          <a:prstGeom prst="line">
+            <a:avLst/>
+          </a:prstGeom>
+          <a:noFill/>
+          <a:ln w="9525">
+            <a:solidFill>
+              <a:schemeClr val="tx1"/>
+            </a:solidFill>
+            <a:prstDash val="dash"/>
+            <a:round/>
+            <a:headEnd/>
+            <a:tailEnd type="triangle" w="med" len="med"/>
+          </a:ln>
+          <a:extLst>
+            <a:ext uri="{909E8E84-426E-40dd-AFC4-6F175D3DCCD1}">
+              <a14:hiddenFill xmlns:a14="http://schemas.microsoft.com/office/drawing/2010/main">
+                <a:noFill/>
+              </a14:hiddenFill>
+            </a:ext>
+          </a:extLst>
+        </p:spPr>
+        <p:txBody>
+          <a:bodyPr/>
+          <a:lstStyle/>
+          <a:p>
+            <a:endParaRPr lang="en-US"/>
+          </a:p>
+        </p:txBody>
+      </p:sp>
+      <p:sp>
+        <p:nvSpPr>
+          <p:cNvPr id="23" name="Text Box 19"/>
+          <p:cNvSpPr txBox="1">
+            <a:spLocks noChangeArrowheads="1"/>
+          </p:cNvSpPr>
+          <p:nvPr/>
+        </p:nvSpPr>
+        <p:spPr bwMode="auto">
+          <a:xfrm>
+            <a:off x="441325" y="5247896"/>
+            <a:ext cx="2073275" cy="1015663"/>
+          </a:xfrm>
+          <a:prstGeom prst="rect">
+            <a:avLst/>
+          </a:prstGeom>
+          <a:noFill/>
+          <a:ln>
+            <a:noFill/>
+          </a:ln>
+          <a:extLst>
+            <a:ext uri="{909E8E84-426E-40dd-AFC4-6F175D3DCCD1}">
+              <a14:hiddenFill xmlns:a14="http://schemas.microsoft.com/office/drawing/2010/main">
+                <a:solidFill>
+                  <a:srgbClr val="FFFFFF"/>
+                </a:solidFill>
+              </a14:hiddenFill>
+            </a:ext>
+            <a:ext uri="{91240B29-F687-4f45-9708-019B960494DF}">
+              <a14:hiddenLine xmlns:a14="http://schemas.microsoft.com/office/drawing/2010/main" w="9525">
+                <a:solidFill>
+                  <a:srgbClr val="000000"/>
+                </a:solidFill>
+                <a:miter lim="800000"/>
+                <a:headEnd/>
+                <a:tailEnd/>
+              </a14:hiddenLine>
+            </a:ext>
+          </a:extLst>
+        </p:spPr>
+        <p:txBody>
+          <a:bodyPr>
+            <a:spAutoFit/>
+          </a:bodyPr>
+          <a:lstStyle>
+            <a:lvl1pPr eaLnBrk="0" hangingPunct="0">
+              <a:defRPr sz="2400">
+                <a:solidFill>
+                  <a:schemeClr val="tx1"/>
+                </a:solidFill>
+                <a:latin typeface="Arial" charset="0"/>
+                <a:ea typeface="ＭＳ Ｐゴシック" charset="0"/>
+                <a:cs typeface="ＭＳ Ｐゴシック" charset="0"/>
+              </a:defRPr>
+            </a:lvl1pPr>
+            <a:lvl2pPr marL="742950" indent="-285750" eaLnBrk="0" hangingPunct="0">
+              <a:defRPr sz="2400">
+                <a:solidFill>
+                  <a:schemeClr val="tx1"/>
+                </a:solidFill>
+                <a:latin typeface="Arial" charset="0"/>
+                <a:ea typeface="ＭＳ Ｐゴシック" charset="0"/>
+              </a:defRPr>
+            </a:lvl2pPr>
+            <a:lvl3pPr marL="1143000" indent="-228600" eaLnBrk="0" hangingPunct="0">
+              <a:defRPr sz="2400">
+                <a:solidFill>
+                  <a:schemeClr val="tx1"/>
+                </a:solidFill>
+                <a:latin typeface="Arial" charset="0"/>
+                <a:ea typeface="ＭＳ Ｐゴシック" charset="0"/>
+              </a:defRPr>
+            </a:lvl3pPr>
+            <a:lvl4pPr marL="1600200" indent="-228600" eaLnBrk="0" hangingPunct="0">
+              <a:defRPr sz="2400">
+                <a:solidFill>
+                  <a:schemeClr val="tx1"/>
+                </a:solidFill>
+                <a:latin typeface="Arial" charset="0"/>
+                <a:ea typeface="ＭＳ Ｐゴシック" charset="0"/>
+              </a:defRPr>
+            </a:lvl4pPr>
+            <a:lvl5pPr marL="2057400" indent="-228600" eaLnBrk="0" hangingPunct="0">
+              <a:defRPr sz="2400">
+                <a:solidFill>
+                  <a:schemeClr val="tx1"/>
+                </a:solidFill>
+                <a:latin typeface="Arial" charset="0"/>
+                <a:ea typeface="ＭＳ Ｐゴシック" charset="0"/>
+              </a:defRPr>
+            </a:lvl5pPr>
+            <a:lvl6pPr marL="2514600" indent="-228600" eaLnBrk="0" fontAlgn="base" hangingPunct="0">
+              <a:spcBef>
+                <a:spcPct val="0"/>
+              </a:spcBef>
+              <a:spcAft>
+                <a:spcPct val="0"/>
+              </a:spcAft>
+              <a:defRPr sz="2400">
+                <a:solidFill>
+                  <a:schemeClr val="tx1"/>
+                </a:solidFill>
+                <a:latin typeface="Arial" charset="0"/>
+                <a:ea typeface="ＭＳ Ｐゴシック" charset="0"/>
+              </a:defRPr>
+            </a:lvl6pPr>
+            <a:lvl7pPr marL="2971800" indent="-228600" eaLnBrk="0" fontAlgn="base" hangingPunct="0">
+              <a:spcBef>
+                <a:spcPct val="0"/>
+              </a:spcBef>
+              <a:spcAft>
+                <a:spcPct val="0"/>
+              </a:spcAft>
+              <a:defRPr sz="2400">
+                <a:solidFill>
+                  <a:schemeClr val="tx1"/>
+                </a:solidFill>
+                <a:latin typeface="Arial" charset="0"/>
+                <a:ea typeface="ＭＳ Ｐゴシック" charset="0"/>
+              </a:defRPr>
+            </a:lvl7pPr>
+            <a:lvl8pPr marL="3429000" indent="-228600" eaLnBrk="0" fontAlgn="base" hangingPunct="0">
+              <a:spcBef>
+                <a:spcPct val="0"/>
+              </a:spcBef>
+              <a:spcAft>
+                <a:spcPct val="0"/>
+              </a:spcAft>
+              <a:defRPr sz="2400">
+                <a:solidFill>
+                  <a:schemeClr val="tx1"/>
+                </a:solidFill>
+                <a:latin typeface="Arial" charset="0"/>
+                <a:ea typeface="ＭＳ Ｐゴシック" charset="0"/>
+              </a:defRPr>
+            </a:lvl8pPr>
+            <a:lvl9pPr marL="3886200" indent="-228600" eaLnBrk="0" fontAlgn="base" hangingPunct="0">
+              <a:spcBef>
+                <a:spcPct val="0"/>
+              </a:spcBef>
+              <a:spcAft>
+                <a:spcPct val="0"/>
+              </a:spcAft>
+              <a:defRPr sz="2400">
+                <a:solidFill>
+                  <a:schemeClr val="tx1"/>
+                </a:solidFill>
+                <a:latin typeface="Arial" charset="0"/>
+                <a:ea typeface="ＭＳ Ｐゴシック" charset="0"/>
+              </a:defRPr>
+            </a:lvl9pPr>
+          </a:lstStyle>
+          <a:p>
+            <a:pPr eaLnBrk="1" hangingPunct="1"/>
+            <a:r>
+              <a:rPr lang="en-US" sz="2000" dirty="0">
+                <a:solidFill>
+                  <a:srgbClr val="0000CC"/>
+                </a:solidFill>
+              </a:rPr>
+              <a:t>h</a:t>
+            </a:r>
+            <a:r>
+              <a:rPr lang="en-US" sz="2000" dirty="0" smtClean="0">
+                <a:solidFill>
+                  <a:srgbClr val="0000CC"/>
+                </a:solidFill>
+              </a:rPr>
+              <a:t>olds resource token but not request token</a:t>
+            </a:r>
+            <a:endParaRPr lang="en-US" sz="2000" dirty="0">
+              <a:solidFill>
+                <a:srgbClr val="0000CC"/>
+              </a:solidFill>
+            </a:endParaRPr>
+          </a:p>
+        </p:txBody>
+      </p:sp>
+      <p:sp>
+        <p:nvSpPr>
+          <p:cNvPr id="24" name="Text Box 8"/>
+          <p:cNvSpPr txBox="1">
+            <a:spLocks noChangeArrowheads="1"/>
+          </p:cNvSpPr>
+          <p:nvPr/>
+        </p:nvSpPr>
+        <p:spPr bwMode="auto">
+          <a:xfrm>
+            <a:off x="2295525" y="5119459"/>
+            <a:ext cx="1768475" cy="923330"/>
+          </a:xfrm>
+          <a:prstGeom prst="rect">
+            <a:avLst/>
+          </a:prstGeom>
+          <a:noFill/>
+          <a:ln>
+            <a:noFill/>
+          </a:ln>
+          <a:extLst>
+            <a:ext uri="{909E8E84-426E-40dd-AFC4-6F175D3DCCD1}">
+              <a14:hiddenFill xmlns:a14="http://schemas.microsoft.com/office/drawing/2010/main">
+                <a:solidFill>
+                  <a:srgbClr val="FFFFFF"/>
+                </a:solidFill>
+              </a14:hiddenFill>
+            </a:ext>
+            <a:ext uri="{91240B29-F687-4f45-9708-019B960494DF}">
+              <a14:hiddenLine xmlns:a14="http://schemas.microsoft.com/office/drawing/2010/main" w="9525">
+                <a:solidFill>
+                  <a:srgbClr val="000000"/>
+                </a:solidFill>
+                <a:miter lim="800000"/>
+                <a:headEnd/>
+                <a:tailEnd/>
+              </a14:hiddenLine>
+            </a:ext>
+          </a:extLst>
+        </p:spPr>
+        <p:txBody>
+          <a:bodyPr>
+            <a:spAutoFit/>
+          </a:bodyPr>
+          <a:lstStyle>
+            <a:lvl1pPr eaLnBrk="0" hangingPunct="0">
+              <a:defRPr sz="2400">
+                <a:solidFill>
+                  <a:schemeClr val="tx1"/>
+                </a:solidFill>
+                <a:latin typeface="Arial" charset="0"/>
+                <a:ea typeface="ＭＳ Ｐゴシック" charset="0"/>
+                <a:cs typeface="ＭＳ Ｐゴシック" charset="0"/>
+              </a:defRPr>
+            </a:lvl1pPr>
+            <a:lvl2pPr marL="742950" indent="-285750" eaLnBrk="0" hangingPunct="0">
+              <a:defRPr sz="2400">
+                <a:solidFill>
+                  <a:schemeClr val="tx1"/>
+                </a:solidFill>
+                <a:latin typeface="Arial" charset="0"/>
+                <a:ea typeface="ＭＳ Ｐゴシック" charset="0"/>
+              </a:defRPr>
+            </a:lvl2pPr>
+            <a:lvl3pPr marL="1143000" indent="-228600" eaLnBrk="0" hangingPunct="0">
+              <a:defRPr sz="2400">
+                <a:solidFill>
+                  <a:schemeClr val="tx1"/>
+                </a:solidFill>
+                <a:latin typeface="Arial" charset="0"/>
+                <a:ea typeface="ＭＳ Ｐゴシック" charset="0"/>
+              </a:defRPr>
+            </a:lvl3pPr>
+            <a:lvl4pPr marL="1600200" indent="-228600" eaLnBrk="0" hangingPunct="0">
+              <a:defRPr sz="2400">
+                <a:solidFill>
+                  <a:schemeClr val="tx1"/>
+                </a:solidFill>
+                <a:latin typeface="Arial" charset="0"/>
+                <a:ea typeface="ＭＳ Ｐゴシック" charset="0"/>
+              </a:defRPr>
+            </a:lvl4pPr>
+            <a:lvl5pPr marL="2057400" indent="-228600" eaLnBrk="0" hangingPunct="0">
+              <a:defRPr sz="2400">
+                <a:solidFill>
+                  <a:schemeClr val="tx1"/>
+                </a:solidFill>
+                <a:latin typeface="Arial" charset="0"/>
+                <a:ea typeface="ＭＳ Ｐゴシック" charset="0"/>
+              </a:defRPr>
+            </a:lvl5pPr>
+            <a:lvl6pPr marL="2514600" indent="-228600" eaLnBrk="0" fontAlgn="base" hangingPunct="0">
+              <a:spcBef>
+                <a:spcPct val="0"/>
+              </a:spcBef>
+              <a:spcAft>
+                <a:spcPct val="0"/>
+              </a:spcAft>
+              <a:defRPr sz="2400">
+                <a:solidFill>
+                  <a:schemeClr val="tx1"/>
+                </a:solidFill>
+                <a:latin typeface="Arial" charset="0"/>
+                <a:ea typeface="ＭＳ Ｐゴシック" charset="0"/>
+              </a:defRPr>
+            </a:lvl6pPr>
+            <a:lvl7pPr marL="2971800" indent="-228600" eaLnBrk="0" fontAlgn="base" hangingPunct="0">
+              <a:spcBef>
+                <a:spcPct val="0"/>
+              </a:spcBef>
+              <a:spcAft>
+                <a:spcPct val="0"/>
+              </a:spcAft>
+              <a:defRPr sz="2400">
+                <a:solidFill>
+                  <a:schemeClr val="tx1"/>
+                </a:solidFill>
+                <a:latin typeface="Arial" charset="0"/>
+                <a:ea typeface="ＭＳ Ｐゴシック" charset="0"/>
+              </a:defRPr>
+            </a:lvl7pPr>
+            <a:lvl8pPr marL="3429000" indent="-228600" eaLnBrk="0" fontAlgn="base" hangingPunct="0">
+              <a:spcBef>
+                <a:spcPct val="0"/>
+              </a:spcBef>
+              <a:spcAft>
+                <a:spcPct val="0"/>
+              </a:spcAft>
+              <a:defRPr sz="2400">
+                <a:solidFill>
+                  <a:schemeClr val="tx1"/>
+                </a:solidFill>
+                <a:latin typeface="Arial" charset="0"/>
+                <a:ea typeface="ＭＳ Ｐゴシック" charset="0"/>
+              </a:defRPr>
+            </a:lvl8pPr>
+            <a:lvl9pPr marL="3886200" indent="-228600" eaLnBrk="0" fontAlgn="base" hangingPunct="0">
+              <a:spcBef>
+                <a:spcPct val="0"/>
+              </a:spcBef>
+              <a:spcAft>
+                <a:spcPct val="0"/>
+              </a:spcAft>
+              <a:defRPr sz="2400">
+                <a:solidFill>
+                  <a:schemeClr val="tx1"/>
+                </a:solidFill>
+                <a:latin typeface="Arial" charset="0"/>
+                <a:ea typeface="ＭＳ Ｐゴシック" charset="0"/>
+              </a:defRPr>
+            </a:lvl9pPr>
+          </a:lstStyle>
+          <a:p>
+            <a:pPr algn="ctr" eaLnBrk="1" hangingPunct="1"/>
+            <a:r>
+              <a:rPr lang="en-US" sz="1800" dirty="0" smtClean="0"/>
+              <a:t>receives </a:t>
+            </a:r>
+            <a:r>
+              <a:rPr lang="en-US" sz="1800" dirty="0" smtClean="0"/>
+              <a:t>request token </a:t>
+            </a:r>
+            <a:r>
+              <a:rPr lang="en-US" sz="1800" dirty="0" smtClean="0"/>
+              <a:t>from client</a:t>
+            </a:r>
+            <a:endParaRPr lang="en-US" sz="1800" dirty="0"/>
+          </a:p>
+        </p:txBody>
+      </p:sp>
+      <p:sp>
+        <p:nvSpPr>
+          <p:cNvPr id="28" name="Text Box 10"/>
+          <p:cNvSpPr txBox="1">
+            <a:spLocks noChangeArrowheads="1"/>
+          </p:cNvSpPr>
+          <p:nvPr/>
+        </p:nvSpPr>
+        <p:spPr bwMode="auto">
+          <a:xfrm>
+            <a:off x="5029200" y="5106785"/>
+            <a:ext cx="1905000" cy="923330"/>
+          </a:xfrm>
+          <a:prstGeom prst="rect">
+            <a:avLst/>
+          </a:prstGeom>
+          <a:noFill/>
+          <a:ln>
+            <a:noFill/>
+          </a:ln>
+          <a:extLst>
+            <a:ext uri="{909E8E84-426E-40dd-AFC4-6F175D3DCCD1}">
+              <a14:hiddenFill xmlns:a14="http://schemas.microsoft.com/office/drawing/2010/main">
+                <a:solidFill>
+                  <a:srgbClr val="FFFFFF"/>
+                </a:solidFill>
+              </a14:hiddenFill>
+            </a:ext>
+            <a:ext uri="{91240B29-F687-4f45-9708-019B960494DF}">
+              <a14:hiddenLine xmlns:a14="http://schemas.microsoft.com/office/drawing/2010/main" w="9525">
+                <a:solidFill>
+                  <a:srgbClr val="000000"/>
+                </a:solidFill>
+                <a:miter lim="800000"/>
+                <a:headEnd/>
+                <a:tailEnd/>
+              </a14:hiddenLine>
+            </a:ext>
+          </a:extLst>
+        </p:spPr>
+        <p:txBody>
+          <a:bodyPr>
+            <a:spAutoFit/>
+          </a:bodyPr>
+          <a:lstStyle>
+            <a:lvl1pPr eaLnBrk="0" hangingPunct="0">
+              <a:defRPr sz="2400">
+                <a:solidFill>
+                  <a:schemeClr val="tx1"/>
+                </a:solidFill>
+                <a:latin typeface="Arial" charset="0"/>
+                <a:ea typeface="ＭＳ Ｐゴシック" charset="0"/>
+                <a:cs typeface="ＭＳ Ｐゴシック" charset="0"/>
+              </a:defRPr>
+            </a:lvl1pPr>
+            <a:lvl2pPr marL="742950" indent="-285750" eaLnBrk="0" hangingPunct="0">
+              <a:defRPr sz="2400">
+                <a:solidFill>
+                  <a:schemeClr val="tx1"/>
+                </a:solidFill>
+                <a:latin typeface="Arial" charset="0"/>
+                <a:ea typeface="ＭＳ Ｐゴシック" charset="0"/>
+              </a:defRPr>
+            </a:lvl2pPr>
+            <a:lvl3pPr marL="1143000" indent="-228600" eaLnBrk="0" hangingPunct="0">
+              <a:defRPr sz="2400">
+                <a:solidFill>
+                  <a:schemeClr val="tx1"/>
+                </a:solidFill>
+                <a:latin typeface="Arial" charset="0"/>
+                <a:ea typeface="ＭＳ Ｐゴシック" charset="0"/>
+              </a:defRPr>
+            </a:lvl3pPr>
+            <a:lvl4pPr marL="1600200" indent="-228600" eaLnBrk="0" hangingPunct="0">
+              <a:defRPr sz="2400">
+                <a:solidFill>
+                  <a:schemeClr val="tx1"/>
+                </a:solidFill>
+                <a:latin typeface="Arial" charset="0"/>
+                <a:ea typeface="ＭＳ Ｐゴシック" charset="0"/>
+              </a:defRPr>
+            </a:lvl4pPr>
+            <a:lvl5pPr marL="2057400" indent="-228600" eaLnBrk="0" hangingPunct="0">
+              <a:defRPr sz="2400">
+                <a:solidFill>
+                  <a:schemeClr val="tx1"/>
+                </a:solidFill>
+                <a:latin typeface="Arial" charset="0"/>
+                <a:ea typeface="ＭＳ Ｐゴシック" charset="0"/>
+              </a:defRPr>
+            </a:lvl5pPr>
+            <a:lvl6pPr marL="2514600" indent="-228600" eaLnBrk="0" fontAlgn="base" hangingPunct="0">
+              <a:spcBef>
+                <a:spcPct val="0"/>
+              </a:spcBef>
+              <a:spcAft>
+                <a:spcPct val="0"/>
+              </a:spcAft>
+              <a:defRPr sz="2400">
+                <a:solidFill>
+                  <a:schemeClr val="tx1"/>
+                </a:solidFill>
+                <a:latin typeface="Arial" charset="0"/>
+                <a:ea typeface="ＭＳ Ｐゴシック" charset="0"/>
+              </a:defRPr>
+            </a:lvl6pPr>
+            <a:lvl7pPr marL="2971800" indent="-228600" eaLnBrk="0" fontAlgn="base" hangingPunct="0">
+              <a:spcBef>
+                <a:spcPct val="0"/>
+              </a:spcBef>
+              <a:spcAft>
+                <a:spcPct val="0"/>
+              </a:spcAft>
+              <a:defRPr sz="2400">
+                <a:solidFill>
+                  <a:schemeClr val="tx1"/>
+                </a:solidFill>
+                <a:latin typeface="Arial" charset="0"/>
+                <a:ea typeface="ＭＳ Ｐゴシック" charset="0"/>
+              </a:defRPr>
+            </a:lvl7pPr>
+            <a:lvl8pPr marL="3429000" indent="-228600" eaLnBrk="0" fontAlgn="base" hangingPunct="0">
+              <a:spcBef>
+                <a:spcPct val="0"/>
+              </a:spcBef>
+              <a:spcAft>
+                <a:spcPct val="0"/>
+              </a:spcAft>
+              <a:defRPr sz="2400">
+                <a:solidFill>
+                  <a:schemeClr val="tx1"/>
+                </a:solidFill>
+                <a:latin typeface="Arial" charset="0"/>
+                <a:ea typeface="ＭＳ Ｐゴシック" charset="0"/>
+              </a:defRPr>
+            </a:lvl8pPr>
+            <a:lvl9pPr marL="3886200" indent="-228600" eaLnBrk="0" fontAlgn="base" hangingPunct="0">
+              <a:spcBef>
+                <a:spcPct val="0"/>
+              </a:spcBef>
+              <a:spcAft>
+                <a:spcPct val="0"/>
+              </a:spcAft>
+              <a:defRPr sz="2400">
+                <a:solidFill>
+                  <a:schemeClr val="tx1"/>
+                </a:solidFill>
+                <a:latin typeface="Arial" charset="0"/>
+                <a:ea typeface="ＭＳ Ｐゴシック" charset="0"/>
+              </a:defRPr>
+            </a:lvl9pPr>
+          </a:lstStyle>
+          <a:p>
+            <a:pPr algn="ctr" eaLnBrk="1" hangingPunct="1"/>
+            <a:r>
+              <a:rPr lang="en-US" sz="1800" dirty="0" smtClean="0"/>
+              <a:t>sends</a:t>
+            </a:r>
+            <a:r>
+              <a:rPr lang="en-US" sz="1800" dirty="0" smtClean="0"/>
+              <a:t> </a:t>
+            </a:r>
+            <a:r>
+              <a:rPr lang="en-US" sz="1800" dirty="0"/>
+              <a:t>resource and request tokens </a:t>
+            </a:r>
+            <a:r>
+              <a:rPr lang="en-US" sz="1800" dirty="0" smtClean="0"/>
+              <a:t>to client</a:t>
+            </a:r>
+            <a:endParaRPr lang="en-US" sz="1800" dirty="0"/>
+          </a:p>
+        </p:txBody>
+      </p:sp>
+      <p:sp>
+        <p:nvSpPr>
+          <p:cNvPr id="31" name="Text Box 23"/>
+          <p:cNvSpPr txBox="1">
+            <a:spLocks noChangeArrowheads="1"/>
+          </p:cNvSpPr>
+          <p:nvPr/>
+        </p:nvSpPr>
+        <p:spPr bwMode="auto">
+          <a:xfrm>
+            <a:off x="6934200" y="5247896"/>
+            <a:ext cx="2073275" cy="1015663"/>
+          </a:xfrm>
+          <a:prstGeom prst="rect">
+            <a:avLst/>
+          </a:prstGeom>
+          <a:noFill/>
+          <a:ln>
+            <a:noFill/>
+          </a:ln>
+          <a:extLst>
+            <a:ext uri="{909E8E84-426E-40dd-AFC4-6F175D3DCCD1}">
+              <a14:hiddenFill xmlns:a14="http://schemas.microsoft.com/office/drawing/2010/main">
+                <a:solidFill>
+                  <a:srgbClr val="FFFFFF"/>
+                </a:solidFill>
+              </a14:hiddenFill>
+            </a:ext>
+            <a:ext uri="{91240B29-F687-4f45-9708-019B960494DF}">
+              <a14:hiddenLine xmlns:a14="http://schemas.microsoft.com/office/drawing/2010/main" w="9525">
+                <a:solidFill>
+                  <a:srgbClr val="000000"/>
+                </a:solidFill>
+                <a:miter lim="800000"/>
+                <a:headEnd/>
+                <a:tailEnd/>
+              </a14:hiddenLine>
+            </a:ext>
+          </a:extLst>
+        </p:spPr>
+        <p:txBody>
+          <a:bodyPr>
+            <a:spAutoFit/>
+          </a:bodyPr>
+          <a:lstStyle>
+            <a:lvl1pPr eaLnBrk="0" hangingPunct="0">
+              <a:defRPr sz="2400">
+                <a:solidFill>
+                  <a:schemeClr val="tx1"/>
+                </a:solidFill>
+                <a:latin typeface="Arial" charset="0"/>
+                <a:ea typeface="ＭＳ Ｐゴシック" charset="0"/>
+                <a:cs typeface="ＭＳ Ｐゴシック" charset="0"/>
+              </a:defRPr>
+            </a:lvl1pPr>
+            <a:lvl2pPr marL="742950" indent="-285750" eaLnBrk="0" hangingPunct="0">
+              <a:defRPr sz="2400">
+                <a:solidFill>
+                  <a:schemeClr val="tx1"/>
+                </a:solidFill>
+                <a:latin typeface="Arial" charset="0"/>
+                <a:ea typeface="ＭＳ Ｐゴシック" charset="0"/>
+              </a:defRPr>
+            </a:lvl2pPr>
+            <a:lvl3pPr marL="1143000" indent="-228600" eaLnBrk="0" hangingPunct="0">
+              <a:defRPr sz="2400">
+                <a:solidFill>
+                  <a:schemeClr val="tx1"/>
+                </a:solidFill>
+                <a:latin typeface="Arial" charset="0"/>
+                <a:ea typeface="ＭＳ Ｐゴシック" charset="0"/>
+              </a:defRPr>
+            </a:lvl3pPr>
+            <a:lvl4pPr marL="1600200" indent="-228600" eaLnBrk="0" hangingPunct="0">
+              <a:defRPr sz="2400">
+                <a:solidFill>
+                  <a:schemeClr val="tx1"/>
+                </a:solidFill>
+                <a:latin typeface="Arial" charset="0"/>
+                <a:ea typeface="ＭＳ Ｐゴシック" charset="0"/>
+              </a:defRPr>
+            </a:lvl4pPr>
+            <a:lvl5pPr marL="2057400" indent="-228600" eaLnBrk="0" hangingPunct="0">
+              <a:defRPr sz="2400">
+                <a:solidFill>
+                  <a:schemeClr val="tx1"/>
+                </a:solidFill>
+                <a:latin typeface="Arial" charset="0"/>
+                <a:ea typeface="ＭＳ Ｐゴシック" charset="0"/>
+              </a:defRPr>
+            </a:lvl5pPr>
+            <a:lvl6pPr marL="2514600" indent="-228600" eaLnBrk="0" fontAlgn="base" hangingPunct="0">
+              <a:spcBef>
+                <a:spcPct val="0"/>
+              </a:spcBef>
+              <a:spcAft>
+                <a:spcPct val="0"/>
+              </a:spcAft>
+              <a:defRPr sz="2400">
+                <a:solidFill>
+                  <a:schemeClr val="tx1"/>
+                </a:solidFill>
+                <a:latin typeface="Arial" charset="0"/>
+                <a:ea typeface="ＭＳ Ｐゴシック" charset="0"/>
+              </a:defRPr>
+            </a:lvl6pPr>
+            <a:lvl7pPr marL="2971800" indent="-228600" eaLnBrk="0" fontAlgn="base" hangingPunct="0">
+              <a:spcBef>
+                <a:spcPct val="0"/>
+              </a:spcBef>
+              <a:spcAft>
+                <a:spcPct val="0"/>
+              </a:spcAft>
+              <a:defRPr sz="2400">
+                <a:solidFill>
+                  <a:schemeClr val="tx1"/>
+                </a:solidFill>
+                <a:latin typeface="Arial" charset="0"/>
+                <a:ea typeface="ＭＳ Ｐゴシック" charset="0"/>
+              </a:defRPr>
+            </a:lvl7pPr>
+            <a:lvl8pPr marL="3429000" indent="-228600" eaLnBrk="0" fontAlgn="base" hangingPunct="0">
+              <a:spcBef>
+                <a:spcPct val="0"/>
+              </a:spcBef>
+              <a:spcAft>
+                <a:spcPct val="0"/>
+              </a:spcAft>
+              <a:defRPr sz="2400">
+                <a:solidFill>
+                  <a:schemeClr val="tx1"/>
+                </a:solidFill>
+                <a:latin typeface="Arial" charset="0"/>
+                <a:ea typeface="ＭＳ Ｐゴシック" charset="0"/>
+              </a:defRPr>
+            </a:lvl8pPr>
+            <a:lvl9pPr marL="3886200" indent="-228600" eaLnBrk="0" fontAlgn="base" hangingPunct="0">
+              <a:spcBef>
+                <a:spcPct val="0"/>
+              </a:spcBef>
+              <a:spcAft>
+                <a:spcPct val="0"/>
+              </a:spcAft>
+              <a:defRPr sz="2400">
+                <a:solidFill>
+                  <a:schemeClr val="tx1"/>
+                </a:solidFill>
+                <a:latin typeface="Arial" charset="0"/>
+                <a:ea typeface="ＭＳ Ｐゴシック" charset="0"/>
+              </a:defRPr>
+            </a:lvl9pPr>
+          </a:lstStyle>
+          <a:p>
+            <a:pPr eaLnBrk="1" hangingPunct="1"/>
+            <a:r>
+              <a:rPr lang="en-US" sz="2000" dirty="0" smtClean="0">
+                <a:solidFill>
+                  <a:srgbClr val="0000CC"/>
+                </a:solidFill>
+              </a:rPr>
+              <a:t>Does not hold </a:t>
+            </a:r>
+            <a:r>
+              <a:rPr lang="en-US" sz="2000" dirty="0">
+                <a:solidFill>
+                  <a:srgbClr val="0000CC"/>
+                </a:solidFill>
+              </a:rPr>
+              <a:t>request </a:t>
+            </a:r>
+            <a:r>
+              <a:rPr lang="en-US" sz="2000" dirty="0" smtClean="0">
+                <a:solidFill>
+                  <a:srgbClr val="0000CC"/>
+                </a:solidFill>
+              </a:rPr>
+              <a:t>or </a:t>
+            </a:r>
+            <a:r>
+              <a:rPr lang="en-US" sz="2000" dirty="0" smtClean="0">
+                <a:solidFill>
+                  <a:srgbClr val="0000CC"/>
+                </a:solidFill>
+              </a:rPr>
+              <a:t>resource </a:t>
+            </a:r>
+            <a:r>
+              <a:rPr lang="en-US" sz="2000" dirty="0">
+                <a:solidFill>
+                  <a:srgbClr val="0000CC"/>
+                </a:solidFill>
+              </a:rPr>
+              <a:t>token</a:t>
+            </a:r>
+          </a:p>
+        </p:txBody>
+      </p:sp>
+      <p:sp>
+        <p:nvSpPr>
+          <p:cNvPr id="32" name="Text Box 17"/>
+          <p:cNvSpPr txBox="1">
+            <a:spLocks noChangeArrowheads="1"/>
+          </p:cNvSpPr>
+          <p:nvPr/>
+        </p:nvSpPr>
+        <p:spPr bwMode="auto">
+          <a:xfrm>
+            <a:off x="3200400" y="2026678"/>
+            <a:ext cx="3238236" cy="369332"/>
+          </a:xfrm>
+          <a:prstGeom prst="rect">
+            <a:avLst/>
+          </a:prstGeom>
+          <a:noFill/>
+          <a:ln>
+            <a:noFill/>
+          </a:ln>
+          <a:extLst>
+            <a:ext uri="{909E8E84-426E-40dd-AFC4-6F175D3DCCD1}">
+              <a14:hiddenFill xmlns:a14="http://schemas.microsoft.com/office/drawing/2010/main">
+                <a:solidFill>
+                  <a:srgbClr val="FFFFFF"/>
+                </a:solidFill>
+              </a14:hiddenFill>
+            </a:ext>
+            <a:ext uri="{91240B29-F687-4f45-9708-019B960494DF}">
+              <a14:hiddenLine xmlns:a14="http://schemas.microsoft.com/office/drawing/2010/main" w="9525">
+                <a:solidFill>
+                  <a:srgbClr val="000000"/>
+                </a:solidFill>
+                <a:miter lim="800000"/>
+                <a:headEnd/>
+                <a:tailEnd/>
+              </a14:hiddenLine>
+            </a:ext>
+          </a:extLst>
+        </p:spPr>
+        <p:txBody>
+          <a:bodyPr wrap="none">
+            <a:spAutoFit/>
+          </a:bodyPr>
+          <a:lstStyle>
+            <a:lvl1pPr eaLnBrk="0" hangingPunct="0">
+              <a:defRPr sz="2400">
+                <a:solidFill>
+                  <a:schemeClr val="tx1"/>
+                </a:solidFill>
+                <a:latin typeface="Arial" charset="0"/>
+                <a:ea typeface="ＭＳ Ｐゴシック" charset="0"/>
+                <a:cs typeface="ＭＳ Ｐゴシック" charset="0"/>
+              </a:defRPr>
+            </a:lvl1pPr>
+            <a:lvl2pPr marL="742950" indent="-285750" eaLnBrk="0" hangingPunct="0">
+              <a:defRPr sz="2400">
+                <a:solidFill>
+                  <a:schemeClr val="tx1"/>
+                </a:solidFill>
+                <a:latin typeface="Arial" charset="0"/>
+                <a:ea typeface="ＭＳ Ｐゴシック" charset="0"/>
+              </a:defRPr>
+            </a:lvl2pPr>
+            <a:lvl3pPr marL="1143000" indent="-228600" eaLnBrk="0" hangingPunct="0">
+              <a:defRPr sz="2400">
+                <a:solidFill>
+                  <a:schemeClr val="tx1"/>
+                </a:solidFill>
+                <a:latin typeface="Arial" charset="0"/>
+                <a:ea typeface="ＭＳ Ｐゴシック" charset="0"/>
+              </a:defRPr>
+            </a:lvl3pPr>
+            <a:lvl4pPr marL="1600200" indent="-228600" eaLnBrk="0" hangingPunct="0">
+              <a:defRPr sz="2400">
+                <a:solidFill>
+                  <a:schemeClr val="tx1"/>
+                </a:solidFill>
+                <a:latin typeface="Arial" charset="0"/>
+                <a:ea typeface="ＭＳ Ｐゴシック" charset="0"/>
+              </a:defRPr>
+            </a:lvl4pPr>
+            <a:lvl5pPr marL="2057400" indent="-228600" eaLnBrk="0" hangingPunct="0">
+              <a:defRPr sz="2400">
+                <a:solidFill>
+                  <a:schemeClr val="tx1"/>
+                </a:solidFill>
+                <a:latin typeface="Arial" charset="0"/>
+                <a:ea typeface="ＭＳ Ｐゴシック" charset="0"/>
+              </a:defRPr>
+            </a:lvl5pPr>
+            <a:lvl6pPr marL="2514600" indent="-228600" eaLnBrk="0" fontAlgn="base" hangingPunct="0">
+              <a:spcBef>
+                <a:spcPct val="0"/>
+              </a:spcBef>
+              <a:spcAft>
+                <a:spcPct val="0"/>
+              </a:spcAft>
+              <a:defRPr sz="2400">
+                <a:solidFill>
+                  <a:schemeClr val="tx1"/>
+                </a:solidFill>
+                <a:latin typeface="Arial" charset="0"/>
+                <a:ea typeface="ＭＳ Ｐゴシック" charset="0"/>
+              </a:defRPr>
+            </a:lvl6pPr>
+            <a:lvl7pPr marL="2971800" indent="-228600" eaLnBrk="0" fontAlgn="base" hangingPunct="0">
+              <a:spcBef>
+                <a:spcPct val="0"/>
+              </a:spcBef>
+              <a:spcAft>
+                <a:spcPct val="0"/>
+              </a:spcAft>
+              <a:defRPr sz="2400">
+                <a:solidFill>
+                  <a:schemeClr val="tx1"/>
+                </a:solidFill>
+                <a:latin typeface="Arial" charset="0"/>
+                <a:ea typeface="ＭＳ Ｐゴシック" charset="0"/>
+              </a:defRPr>
+            </a:lvl7pPr>
+            <a:lvl8pPr marL="3429000" indent="-228600" eaLnBrk="0" fontAlgn="base" hangingPunct="0">
+              <a:spcBef>
+                <a:spcPct val="0"/>
+              </a:spcBef>
+              <a:spcAft>
+                <a:spcPct val="0"/>
+              </a:spcAft>
+              <a:defRPr sz="2400">
+                <a:solidFill>
+                  <a:schemeClr val="tx1"/>
+                </a:solidFill>
+                <a:latin typeface="Arial" charset="0"/>
+                <a:ea typeface="ＭＳ Ｐゴシック" charset="0"/>
+              </a:defRPr>
+            </a:lvl8pPr>
+            <a:lvl9pPr marL="3886200" indent="-228600" eaLnBrk="0" fontAlgn="base" hangingPunct="0">
+              <a:spcBef>
+                <a:spcPct val="0"/>
+              </a:spcBef>
+              <a:spcAft>
+                <a:spcPct val="0"/>
+              </a:spcAft>
+              <a:defRPr sz="2400">
+                <a:solidFill>
+                  <a:schemeClr val="tx1"/>
+                </a:solidFill>
+                <a:latin typeface="Arial" charset="0"/>
+                <a:ea typeface="ＭＳ Ｐゴシック" charset="0"/>
+              </a:defRPr>
+            </a:lvl9pPr>
+          </a:lstStyle>
+          <a:p>
+            <a:pPr eaLnBrk="1" hangingPunct="1"/>
+            <a:r>
+              <a:rPr lang="en-US" sz="1800" dirty="0"/>
+              <a:t>Returns resource </a:t>
+            </a:r>
+            <a:r>
+              <a:rPr lang="en-US" sz="1800" dirty="0" smtClean="0"/>
+              <a:t>token to OS</a:t>
+            </a:r>
+            <a:endParaRPr lang="en-US" sz="1800" dirty="0"/>
+          </a:p>
+        </p:txBody>
+      </p:sp>
+      <p:sp>
+        <p:nvSpPr>
+          <p:cNvPr id="26" name="Oval 21"/>
+          <p:cNvSpPr>
+            <a:spLocks noChangeAspect="1" noChangeArrowheads="1"/>
+          </p:cNvSpPr>
+          <p:nvPr/>
+        </p:nvSpPr>
+        <p:spPr bwMode="auto">
+          <a:xfrm>
+            <a:off x="1745986" y="4257296"/>
+            <a:ext cx="274638" cy="274638"/>
+          </a:xfrm>
+          <a:prstGeom prst="ellipse">
+            <a:avLst/>
+          </a:prstGeom>
+          <a:solidFill>
+            <a:schemeClr val="accent1"/>
+          </a:solidFill>
+          <a:ln>
+            <a:noFill/>
+          </a:ln>
+          <a:extLst>
+            <a:ext uri="{91240B29-F687-4f45-9708-019B960494DF}">
+              <a14:hiddenLine xmlns:a14="http://schemas.microsoft.com/office/drawing/2010/main" w="9525">
+                <a:solidFill>
+                  <a:srgbClr val="000000"/>
+                </a:solidFill>
+                <a:round/>
+                <a:headEnd/>
+                <a:tailEnd/>
+              </a14:hiddenLine>
+            </a:ext>
+          </a:extLst>
+        </p:spPr>
+        <p:txBody>
+          <a:bodyPr wrap="none" anchor="ctr"/>
+          <a:lstStyle/>
+          <a:p>
+            <a:endParaRPr lang="en-US"/>
+          </a:p>
+        </p:txBody>
+      </p:sp>
+      <p:sp>
+        <p:nvSpPr>
+          <p:cNvPr id="27" name="Oval 21"/>
+          <p:cNvSpPr>
+            <a:spLocks noChangeAspect="1" noChangeArrowheads="1"/>
+          </p:cNvSpPr>
+          <p:nvPr/>
+        </p:nvSpPr>
+        <p:spPr bwMode="auto">
+          <a:xfrm>
+            <a:off x="4258734" y="4257296"/>
+            <a:ext cx="274638" cy="274638"/>
+          </a:xfrm>
+          <a:prstGeom prst="ellipse">
+            <a:avLst/>
+          </a:prstGeom>
+          <a:solidFill>
+            <a:schemeClr val="accent1"/>
+          </a:solidFill>
+          <a:ln>
+            <a:noFill/>
+          </a:ln>
+          <a:extLst>
+            <a:ext uri="{91240B29-F687-4f45-9708-019B960494DF}">
+              <a14:hiddenLine xmlns:a14="http://schemas.microsoft.com/office/drawing/2010/main" w="9525">
+                <a:solidFill>
+                  <a:srgbClr val="000000"/>
+                </a:solidFill>
+                <a:round/>
+                <a:headEnd/>
+                <a:tailEnd/>
+              </a14:hiddenLine>
+            </a:ext>
+          </a:extLst>
+        </p:spPr>
+        <p:txBody>
+          <a:bodyPr wrap="none" anchor="ctr"/>
+          <a:lstStyle/>
+          <a:p>
+            <a:endParaRPr lang="en-US"/>
+          </a:p>
+        </p:txBody>
+      </p:sp>
+      <p:sp>
+        <p:nvSpPr>
+          <p:cNvPr id="33" name="Rectangle 22"/>
+          <p:cNvSpPr>
+            <a:spLocks noChangeAspect="1" noChangeArrowheads="1"/>
+          </p:cNvSpPr>
+          <p:nvPr/>
+        </p:nvSpPr>
+        <p:spPr bwMode="auto">
+          <a:xfrm>
+            <a:off x="4664075" y="4231341"/>
+            <a:ext cx="365125" cy="365125"/>
+          </a:xfrm>
+          <a:prstGeom prst="rect">
+            <a:avLst/>
+          </a:prstGeom>
+          <a:solidFill>
+            <a:srgbClr val="0000CC"/>
+          </a:solidFill>
+          <a:ln>
+            <a:noFill/>
+          </a:ln>
+          <a:extLst>
+            <a:ext uri="{91240B29-F687-4f45-9708-019B960494DF}">
+              <a14:hiddenLine xmlns:a14="http://schemas.microsoft.com/office/drawing/2010/main" w="9525">
+                <a:solidFill>
+                  <a:srgbClr val="000000"/>
+                </a:solidFill>
+                <a:miter lim="800000"/>
+                <a:headEnd/>
+                <a:tailEnd/>
+              </a14:hiddenLine>
+            </a:ext>
+          </a:extLst>
+        </p:spPr>
+        <p:txBody>
+          <a:bodyPr wrap="none" anchor="ctr"/>
+          <a:lstStyle/>
+          <a:p>
+            <a:endParaRPr lang="en-US"/>
+          </a:p>
+        </p:txBody>
+      </p:sp>
+      <p:sp>
+        <p:nvSpPr>
+          <p:cNvPr id="34" name="Text Box 19"/>
+          <p:cNvSpPr txBox="1">
+            <a:spLocks noChangeArrowheads="1"/>
+          </p:cNvSpPr>
+          <p:nvPr/>
+        </p:nvSpPr>
+        <p:spPr bwMode="auto">
+          <a:xfrm>
+            <a:off x="3412069" y="6030115"/>
+            <a:ext cx="2566728" cy="707886"/>
+          </a:xfrm>
+          <a:prstGeom prst="rect">
+            <a:avLst/>
+          </a:prstGeom>
+          <a:noFill/>
+          <a:ln>
+            <a:noFill/>
+          </a:ln>
+          <a:extLst>
+            <a:ext uri="{909E8E84-426E-40dd-AFC4-6F175D3DCCD1}">
+              <a14:hiddenFill xmlns:a14="http://schemas.microsoft.com/office/drawing/2010/main">
+                <a:solidFill>
+                  <a:srgbClr val="FFFFFF"/>
+                </a:solidFill>
+              </a14:hiddenFill>
+            </a:ext>
+            <a:ext uri="{91240B29-F687-4f45-9708-019B960494DF}">
+              <a14:hiddenLine xmlns:a14="http://schemas.microsoft.com/office/drawing/2010/main" w="9525">
+                <a:solidFill>
+                  <a:srgbClr val="000000"/>
+                </a:solidFill>
+                <a:miter lim="800000"/>
+                <a:headEnd/>
+                <a:tailEnd/>
+              </a14:hiddenLine>
+            </a:ext>
+          </a:extLst>
+        </p:spPr>
+        <p:txBody>
+          <a:bodyPr wrap="square">
+            <a:spAutoFit/>
+          </a:bodyPr>
+          <a:lstStyle>
+            <a:lvl1pPr eaLnBrk="0" hangingPunct="0">
+              <a:defRPr sz="2400">
+                <a:solidFill>
+                  <a:schemeClr val="tx1"/>
+                </a:solidFill>
+                <a:latin typeface="Arial" charset="0"/>
+                <a:ea typeface="ＭＳ Ｐゴシック" charset="0"/>
+                <a:cs typeface="ＭＳ Ｐゴシック" charset="0"/>
+              </a:defRPr>
+            </a:lvl1pPr>
+            <a:lvl2pPr marL="742950" indent="-285750" eaLnBrk="0" hangingPunct="0">
+              <a:defRPr sz="2400">
+                <a:solidFill>
+                  <a:schemeClr val="tx1"/>
+                </a:solidFill>
+                <a:latin typeface="Arial" charset="0"/>
+                <a:ea typeface="ＭＳ Ｐゴシック" charset="0"/>
+              </a:defRPr>
+            </a:lvl2pPr>
+            <a:lvl3pPr marL="1143000" indent="-228600" eaLnBrk="0" hangingPunct="0">
+              <a:defRPr sz="2400">
+                <a:solidFill>
+                  <a:schemeClr val="tx1"/>
+                </a:solidFill>
+                <a:latin typeface="Arial" charset="0"/>
+                <a:ea typeface="ＭＳ Ｐゴシック" charset="0"/>
+              </a:defRPr>
+            </a:lvl3pPr>
+            <a:lvl4pPr marL="1600200" indent="-228600" eaLnBrk="0" hangingPunct="0">
+              <a:defRPr sz="2400">
+                <a:solidFill>
+                  <a:schemeClr val="tx1"/>
+                </a:solidFill>
+                <a:latin typeface="Arial" charset="0"/>
+                <a:ea typeface="ＭＳ Ｐゴシック" charset="0"/>
+              </a:defRPr>
+            </a:lvl4pPr>
+            <a:lvl5pPr marL="2057400" indent="-228600" eaLnBrk="0" hangingPunct="0">
+              <a:defRPr sz="2400">
+                <a:solidFill>
+                  <a:schemeClr val="tx1"/>
+                </a:solidFill>
+                <a:latin typeface="Arial" charset="0"/>
+                <a:ea typeface="ＭＳ Ｐゴシック" charset="0"/>
+              </a:defRPr>
+            </a:lvl5pPr>
+            <a:lvl6pPr marL="2514600" indent="-228600" eaLnBrk="0" fontAlgn="base" hangingPunct="0">
+              <a:spcBef>
+                <a:spcPct val="0"/>
+              </a:spcBef>
+              <a:spcAft>
+                <a:spcPct val="0"/>
+              </a:spcAft>
+              <a:defRPr sz="2400">
+                <a:solidFill>
+                  <a:schemeClr val="tx1"/>
+                </a:solidFill>
+                <a:latin typeface="Arial" charset="0"/>
+                <a:ea typeface="ＭＳ Ｐゴシック" charset="0"/>
+              </a:defRPr>
+            </a:lvl6pPr>
+            <a:lvl7pPr marL="2971800" indent="-228600" eaLnBrk="0" fontAlgn="base" hangingPunct="0">
+              <a:spcBef>
+                <a:spcPct val="0"/>
+              </a:spcBef>
+              <a:spcAft>
+                <a:spcPct val="0"/>
+              </a:spcAft>
+              <a:defRPr sz="2400">
+                <a:solidFill>
+                  <a:schemeClr val="tx1"/>
+                </a:solidFill>
+                <a:latin typeface="Arial" charset="0"/>
+                <a:ea typeface="ＭＳ Ｐゴシック" charset="0"/>
+              </a:defRPr>
+            </a:lvl7pPr>
+            <a:lvl8pPr marL="3429000" indent="-228600" eaLnBrk="0" fontAlgn="base" hangingPunct="0">
+              <a:spcBef>
+                <a:spcPct val="0"/>
+              </a:spcBef>
+              <a:spcAft>
+                <a:spcPct val="0"/>
+              </a:spcAft>
+              <a:defRPr sz="2400">
+                <a:solidFill>
+                  <a:schemeClr val="tx1"/>
+                </a:solidFill>
+                <a:latin typeface="Arial" charset="0"/>
+                <a:ea typeface="ＭＳ Ｐゴシック" charset="0"/>
+              </a:defRPr>
+            </a:lvl8pPr>
+            <a:lvl9pPr marL="3886200" indent="-228600" eaLnBrk="0" fontAlgn="base" hangingPunct="0">
+              <a:spcBef>
+                <a:spcPct val="0"/>
+              </a:spcBef>
+              <a:spcAft>
+                <a:spcPct val="0"/>
+              </a:spcAft>
+              <a:defRPr sz="2400">
+                <a:solidFill>
+                  <a:schemeClr val="tx1"/>
+                </a:solidFill>
+                <a:latin typeface="Arial" charset="0"/>
+                <a:ea typeface="ＭＳ Ｐゴシック" charset="0"/>
+              </a:defRPr>
+            </a:lvl9pPr>
+          </a:lstStyle>
+          <a:p>
+            <a:pPr eaLnBrk="1" hangingPunct="1"/>
+            <a:r>
+              <a:rPr lang="en-US" sz="2000" dirty="0">
+                <a:solidFill>
+                  <a:srgbClr val="0000CC"/>
+                </a:solidFill>
+              </a:rPr>
+              <a:t>h</a:t>
+            </a:r>
+            <a:r>
+              <a:rPr lang="en-US" sz="2000" dirty="0" smtClean="0">
+                <a:solidFill>
+                  <a:srgbClr val="0000CC"/>
+                </a:solidFill>
+              </a:rPr>
+              <a:t>olds resource but not request token</a:t>
+            </a:r>
+            <a:endParaRPr lang="en-US" sz="2000" dirty="0">
+              <a:solidFill>
+                <a:srgbClr val="0000CC"/>
+              </a:solidFill>
+            </a:endParaRPr>
+          </a:p>
+        </p:txBody>
+      </p:sp>
+      <p:cxnSp>
+        <p:nvCxnSpPr>
+          <p:cNvPr id="3" name="Straight Arrow Connector 2"/>
+          <p:cNvCxnSpPr>
+            <a:stCxn id="34" idx="0"/>
+            <a:endCxn id="36878" idx="2"/>
+          </p:cNvCxnSpPr>
+          <p:nvPr/>
+        </p:nvCxnSpPr>
+        <p:spPr>
+          <a:xfrm flipH="1" flipV="1">
+            <a:off x="4648200" y="5247896"/>
+            <a:ext cx="47233" cy="782219"/>
+          </a:xfrm>
+          <a:prstGeom prst="straightConnector1">
+            <a:avLst/>
+          </a:prstGeom>
+          <a:ln>
+            <a:prstDash val="dash"/>
+            <a:tailEnd type="arrow"/>
+          </a:ln>
+        </p:spPr>
+        <p:style>
+          <a:lnRef idx="2">
+            <a:schemeClr val="accent1"/>
+          </a:lnRef>
+          <a:fillRef idx="0">
+            <a:schemeClr val="accent1"/>
+          </a:fillRef>
+          <a:effectRef idx="1">
+            <a:schemeClr val="accent1"/>
+          </a:effectRef>
+          <a:fontRef idx="minor">
+            <a:schemeClr val="tx1"/>
+          </a:fontRef>
+        </p:style>
+      </p:cxnSp>
+    </p:spTree>
+    <p:extLst>
+      <p:ext uri="{BB962C8B-B14F-4D97-AF65-F5344CB8AC3E}">
+        <p14:creationId xmlns:p14="http://schemas.microsoft.com/office/powerpoint/2010/main" val="3658022077"/>
+      </p:ext>
+    </p:extLst>
+  </p:cSld>
+  <p:clrMapOvr>
+    <a:masterClrMapping/>
+  </p:clrMapOvr>
+  <p:timing>
+    <p:tnLst>
+      <p:par>
+        <p:cTn xmlns:p14="http://schemas.microsoft.com/office/powerpoint/2010/main" id="1" dur="indefinite" restart="never" nodeType="tmRoot"/>
+      </p:par>
+    </p:tnLst>
+  </p:timing>
+</p:sld>
+</file>
+
 <file path=ppt/slides/slide3.xml><?xml version="1.0" encoding="utf-8"?>
 <p:sld xmlns:a="http://schemas.openxmlformats.org/drawingml/2006/main" xmlns:r="http://schemas.openxmlformats.org/officeDocument/2006/relationships" xmlns:p="http://schemas.openxmlformats.org/presentationml/2006/main">
   <p:cSld>
@@ -21193,19 +23275,7 @@
               <a:rPr lang="en-US" sz="2800" b="1" dirty="0" smtClean="0">
                 <a:latin typeface="Arial" charset="0"/>
               </a:rPr>
-              <a:t>Undirected graph.</a:t>
-            </a:r>
-            <a:r>
-              <a:rPr lang="en-US" sz="2800" b="1" dirty="0" smtClean="0">
-                <a:latin typeface="Arial" charset="0"/>
-              </a:rPr>
-              <a:t> Nodes are agents</a:t>
-            </a:r>
-            <a:r>
-              <a:rPr lang="en-US" sz="2800" b="1" dirty="0" smtClean="0">
-                <a:latin typeface="Arial" charset="0"/>
-              </a:rPr>
-              <a:t>. Edges are bidirectional channels</a:t>
+              <a:t>Undirected graph. Nodes are agents. Edges are bidirectional channels</a:t>
             </a:r>
             <a:endParaRPr lang="en-US" sz="2800" b="1" dirty="0">
               <a:latin typeface="Arial" charset="0"/>
@@ -22732,19 +24802,7 @@
               <a:rPr lang="en-US" sz="3200" b="1" dirty="0" smtClean="0">
                 <a:latin typeface="Arial" charset="0"/>
               </a:rPr>
-              <a:t>Safety </a:t>
-            </a:r>
-            <a:r>
-              <a:rPr lang="en-US" sz="3200" b="1" dirty="0" smtClean="0">
-                <a:latin typeface="Arial" charset="0"/>
-              </a:rPr>
-              <a:t>property: </a:t>
-            </a:r>
-            <a:r>
-              <a:rPr lang="en-US" sz="3200" b="1" dirty="0" smtClean="0">
-                <a:latin typeface="Arial" charset="0"/>
-              </a:rPr>
-              <a:t/>
+              <a:t>Safety property: </a:t>
             </a:r>
             <a:br>
               <a:rPr lang="en-US" sz="3200" b="1" dirty="0" smtClean="0">
@@ -22755,13 +24813,7 @@
               <a:rPr lang="en-US" sz="3200" b="1" dirty="0" smtClean="0">
                 <a:latin typeface="Arial" charset="0"/>
               </a:rPr>
-              <a:t>Always </a:t>
-            </a:r>
-            <a:r>
-              <a:rPr lang="en-US" sz="3200" b="1" dirty="0" smtClean="0">
-                <a:latin typeface="Arial" charset="0"/>
-              </a:rPr>
-              <a:t>neighbors aren’t eating</a:t>
+              <a:t>Always neighbors aren’t eating</a:t>
             </a:r>
             <a:endParaRPr lang="en-US" sz="3200" b="1" dirty="0">
               <a:latin typeface="Arial" charset="0"/>
@@ -24565,13 +26617,8 @@
           <a:p>
             <a:r>
               <a:rPr lang="en-US" sz="2800" dirty="0" smtClean="0"/>
-              <a:t>Safety </a:t>
-            </a:r>
-            <a:r>
-              <a:rPr lang="en-US" sz="2800" dirty="0" smtClean="0"/>
-              <a:t>property satisfied:</a:t>
-            </a:r>
-            <a:endParaRPr lang="en-US" sz="2800" dirty="0" smtClean="0"/>
+              <a:t>Safety property satisfied:</a:t>
+            </a:r>
           </a:p>
           <a:p>
             <a:r>
@@ -24695,7 +26742,19 @@
               <a:rPr lang="en-US" sz="2800" b="1" dirty="0" smtClean="0">
                 <a:latin typeface="Arial" charset="0"/>
               </a:rPr>
-              <a:t>Client to OS messages:</a:t>
+              <a:t>Client to OS </a:t>
+            </a:r>
+            <a:r>
+              <a:rPr lang="en-US" sz="2800" b="1" dirty="0" smtClean="0">
+                <a:latin typeface="Arial" charset="0"/>
+              </a:rPr>
+              <a:t>tokens:</a:t>
+            </a:r>
+            <a:r>
+              <a:rPr lang="en-US" sz="2800" b="1" dirty="0" smtClean="0">
+                <a:latin typeface="Arial" charset="0"/>
+              </a:rPr>
+              <a:t/>
             </a:r>
             <a:br>
               <a:rPr lang="en-US" sz="2800" b="1" dirty="0" smtClean="0">
@@ -24706,18 +26765,13 @@
               <a:rPr lang="en-US" sz="2800" b="1" dirty="0" smtClean="0">
                 <a:latin typeface="Arial" charset="0"/>
               </a:rPr>
-              <a:t>Tokens: example of an invariant structure</a:t>
-            </a:r>
-            <a:br>
+              <a:t>request </a:t>
+            </a:r>
+            <a:r>
               <a:rPr lang="en-US" sz="2800" b="1" dirty="0" smtClean="0">
                 <a:latin typeface="Arial" charset="0"/>
               </a:rPr>
-            </a:br>
-            <a:r>
-              <a:rPr lang="en-US" sz="2800" b="1" dirty="0" smtClean="0">
-                <a:latin typeface="Arial" charset="0"/>
-              </a:rPr>
-              <a:t>request token: </a:t>
+              <a:t>token: </a:t>
             </a:r>
             <a:br>
               <a:rPr lang="en-US" sz="2800" b="1" dirty="0" smtClean="0">
@@ -26252,7 +28306,7 @@
         </p:nvSpPr>
         <p:spPr bwMode="auto">
           <a:xfrm>
-            <a:off x="5689040" y="1185628"/>
+            <a:off x="5729879" y="820503"/>
             <a:ext cx="365125" cy="365125"/>
           </a:xfrm>
           <a:prstGeom prst="rect">
@@ -26295,7 +28349,7 @@
         </p:nvSpPr>
         <p:spPr bwMode="auto">
           <a:xfrm>
-            <a:off x="5743668" y="1595857"/>
+            <a:off x="5784829" y="1321219"/>
             <a:ext cx="274638" cy="274638"/>
           </a:xfrm>
           <a:prstGeom prst="ellipse">
@@ -28610,11 +30664,6 @@
               </a:rPr>
               <a:t>1</a:t>
             </a:r>
-            <a:endParaRPr lang="en-US" sz="3200" dirty="0">
-              <a:solidFill>
-                <a:srgbClr val="000000"/>
-              </a:solidFill>
-            </a:endParaRPr>
           </a:p>
         </p:txBody>
       </p:sp>
@@ -28661,11 +30710,6 @@
               </a:rPr>
               <a:t>2</a:t>
             </a:r>
-            <a:endParaRPr lang="en-US" sz="3200" dirty="0">
-              <a:solidFill>
-                <a:srgbClr val="000000"/>
-              </a:solidFill>
-            </a:endParaRPr>
           </a:p>
         </p:txBody>
       </p:sp>
@@ -28996,11 +31040,6 @@
               </a:rPr>
               <a:t>1</a:t>
             </a:r>
-            <a:endParaRPr lang="en-US" sz="3200" dirty="0">
-              <a:solidFill>
-                <a:srgbClr val="000000"/>
-              </a:solidFill>
-            </a:endParaRPr>
           </a:p>
         </p:txBody>
       </p:sp>
@@ -29047,11 +31086,6 @@
               </a:rPr>
               <a:t>2</a:t>
             </a:r>
-            <a:endParaRPr lang="en-US" sz="3200" dirty="0">
-              <a:solidFill>
-                <a:srgbClr val="000000"/>
-              </a:solidFill>
-            </a:endParaRPr>
           </a:p>
         </p:txBody>
       </p:sp>

</xml_diff>